<commit_message>
are you the culprit?
</commit_message>
<xml_diff>
--- a/Images/Remote Sensing Slides (for editing graphics).pptx
+++ b/Images/Remote Sensing Slides (for editing graphics).pptx
@@ -8,6 +8,8 @@
     <p:sldId id="259" r:id="rId2"/>
     <p:sldId id="258" r:id="rId3"/>
     <p:sldId id="260" r:id="rId4"/>
+    <p:sldId id="261" r:id="rId5"/>
+    <p:sldId id="262" r:id="rId6"/>
   </p:sldIdLst>
   <p:sldSz cx="12192000" cy="6858000"/>
   <p:notesSz cx="6858000" cy="9144000"/>
@@ -9354,6 +9356,4094 @@
 </p:sld>
 </file>
 
+<file path=ppt/slides/slide4.xml><?xml version="1.0" encoding="utf-8"?>
+<p:sld xmlns:a="http://schemas.openxmlformats.org/drawingml/2006/main" xmlns:r="http://schemas.openxmlformats.org/officeDocument/2006/relationships" xmlns:p="http://schemas.openxmlformats.org/presentationml/2006/main">
+  <p:cSld>
+    <p:spTree>
+      <p:nvGrpSpPr>
+        <p:cNvPr id="1" name=""/>
+        <p:cNvGrpSpPr/>
+        <p:nvPr/>
+      </p:nvGrpSpPr>
+      <p:grpSpPr>
+        <a:xfrm>
+          <a:off x="0" y="0"/>
+          <a:ext cx="0" cy="0"/>
+          <a:chOff x="0" y="0"/>
+          <a:chExt cx="0" cy="0"/>
+        </a:xfrm>
+      </p:grpSpPr>
+      <p:graphicFrame>
+        <p:nvGraphicFramePr>
+          <p:cNvPr id="4" name="Content Placeholder 3">
+            <a:extLst>
+              <a:ext uri="{FF2B5EF4-FFF2-40B4-BE49-F238E27FC236}">
+                <a16:creationId xmlns:a16="http://schemas.microsoft.com/office/drawing/2014/main" id="{6B2243F5-E035-3217-0B4F-CD95B386E332}"/>
+              </a:ext>
+            </a:extLst>
+          </p:cNvPr>
+          <p:cNvGraphicFramePr>
+            <a:graphicFrameLocks noGrp="1"/>
+          </p:cNvGraphicFramePr>
+          <p:nvPr>
+            <p:ph idx="1"/>
+            <p:extLst>
+              <p:ext uri="{D42A27DB-BD31-4B8C-83A1-F6EECF244321}">
+                <p14:modId xmlns:p14="http://schemas.microsoft.com/office/powerpoint/2010/main" val="1953022973"/>
+              </p:ext>
+            </p:extLst>
+          </p:nvPr>
+        </p:nvGraphicFramePr>
+        <p:xfrm>
+          <a:off x="1342271" y="1019712"/>
+          <a:ext cx="9699256" cy="4465911"/>
+        </p:xfrm>
+        <a:graphic>
+          <a:graphicData uri="http://schemas.openxmlformats.org/drawingml/2006/table">
+            <a:tbl>
+              <a:tblPr>
+                <a:tableStyleId>{5C22544A-7EE6-4342-B048-85BDC9FD1C3A}</a:tableStyleId>
+              </a:tblPr>
+              <a:tblGrid>
+                <a:gridCol w="3058996">
+                  <a:extLst>
+                    <a:ext uri="{9D8B030D-6E8A-4147-A177-3AD203B41FA5}">
+                      <a16:colId xmlns:a16="http://schemas.microsoft.com/office/drawing/2014/main" val="1341415904"/>
+                    </a:ext>
+                  </a:extLst>
+                </a:gridCol>
+                <a:gridCol w="1380279">
+                  <a:extLst>
+                    <a:ext uri="{9D8B030D-6E8A-4147-A177-3AD203B41FA5}">
+                      <a16:colId xmlns:a16="http://schemas.microsoft.com/office/drawing/2014/main" val="1335735888"/>
+                    </a:ext>
+                  </a:extLst>
+                </a:gridCol>
+                <a:gridCol w="1753327">
+                  <a:extLst>
+                    <a:ext uri="{9D8B030D-6E8A-4147-A177-3AD203B41FA5}">
+                      <a16:colId xmlns:a16="http://schemas.microsoft.com/office/drawing/2014/main" val="4103278927"/>
+                    </a:ext>
+                  </a:extLst>
+                </a:gridCol>
+                <a:gridCol w="1753327">
+                  <a:extLst>
+                    <a:ext uri="{9D8B030D-6E8A-4147-A177-3AD203B41FA5}">
+                      <a16:colId xmlns:a16="http://schemas.microsoft.com/office/drawing/2014/main" val="2521190952"/>
+                    </a:ext>
+                  </a:extLst>
+                </a:gridCol>
+                <a:gridCol w="1753327">
+                  <a:extLst>
+                    <a:ext uri="{9D8B030D-6E8A-4147-A177-3AD203B41FA5}">
+                      <a16:colId xmlns:a16="http://schemas.microsoft.com/office/drawing/2014/main" val="3512952144"/>
+                    </a:ext>
+                  </a:extLst>
+                </a:gridCol>
+              </a:tblGrid>
+              <a:tr h="503615">
+                <a:tc>
+                  <a:txBody>
+                    <a:bodyPr/>
+                    <a:lstStyle/>
+                    <a:p>
+                      <a:pPr algn="ctr" fontAlgn="ctr"/>
+                      <a:r>
+                        <a:rPr lang="en-SG" sz="1800" b="1" u="none" strike="noStrike" dirty="0">
+                          <a:effectLst/>
+                        </a:rPr>
+                        <a:t>Item</a:t>
+                      </a:r>
+                      <a:endParaRPr lang="en-SG" sz="1800" b="1" i="0" u="none" strike="noStrike" dirty="0">
+                        <a:solidFill>
+                          <a:srgbClr val="000000"/>
+                        </a:solidFill>
+                        <a:effectLst/>
+                        <a:latin typeface="Calibri" panose="020F0502020204030204" pitchFamily="34" charset="0"/>
+                      </a:endParaRPr>
+                    </a:p>
+                  </a:txBody>
+                  <a:tcPr marL="11191" marR="11191" marT="11191" marB="0" anchor="ctr">
+                    <a:lnL w="12700" cap="flat" cmpd="sng" algn="ctr">
+                      <a:solidFill>
+                        <a:schemeClr val="tx1"/>
+                      </a:solidFill>
+                      <a:prstDash val="solid"/>
+                      <a:round/>
+                      <a:headEnd type="none" w="med" len="med"/>
+                      <a:tailEnd type="none" w="med" len="med"/>
+                    </a:lnL>
+                    <a:lnR w="12700" cap="flat" cmpd="sng" algn="ctr">
+                      <a:solidFill>
+                        <a:schemeClr val="tx1"/>
+                      </a:solidFill>
+                      <a:prstDash val="solid"/>
+                      <a:round/>
+                      <a:headEnd type="none" w="med" len="med"/>
+                      <a:tailEnd type="none" w="med" len="med"/>
+                    </a:lnR>
+                    <a:lnT w="12700" cap="flat" cmpd="sng" algn="ctr">
+                      <a:solidFill>
+                        <a:schemeClr val="tx1"/>
+                      </a:solidFill>
+                      <a:prstDash val="solid"/>
+                      <a:round/>
+                      <a:headEnd type="none" w="med" len="med"/>
+                      <a:tailEnd type="none" w="med" len="med"/>
+                    </a:lnT>
+                    <a:lnB w="12700" cap="flat" cmpd="sng" algn="ctr">
+                      <a:solidFill>
+                        <a:schemeClr val="tx1"/>
+                      </a:solidFill>
+                      <a:prstDash val="solid"/>
+                      <a:round/>
+                      <a:headEnd type="none" w="med" len="med"/>
+                      <a:tailEnd type="none" w="med" len="med"/>
+                    </a:lnB>
+                    <a:noFill/>
+                  </a:tcPr>
+                </a:tc>
+                <a:tc>
+                  <a:txBody>
+                    <a:bodyPr/>
+                    <a:lstStyle/>
+                    <a:p>
+                      <a:pPr algn="ctr" fontAlgn="ctr"/>
+                      <a:r>
+                        <a:rPr lang="en-SG" sz="1800" b="1" u="none" strike="noStrike">
+                          <a:effectLst/>
+                        </a:rPr>
+                        <a:t>Quantity</a:t>
+                      </a:r>
+                      <a:endParaRPr lang="en-SG" sz="1800" b="1" i="0" u="none" strike="noStrike">
+                        <a:solidFill>
+                          <a:srgbClr val="000000"/>
+                        </a:solidFill>
+                        <a:effectLst/>
+                        <a:latin typeface="Calibri" panose="020F0502020204030204" pitchFamily="34" charset="0"/>
+                      </a:endParaRPr>
+                    </a:p>
+                  </a:txBody>
+                  <a:tcPr marL="11191" marR="11191" marT="11191" marB="0" anchor="ctr">
+                    <a:lnL w="12700" cap="flat" cmpd="sng" algn="ctr">
+                      <a:solidFill>
+                        <a:schemeClr val="tx1"/>
+                      </a:solidFill>
+                      <a:prstDash val="solid"/>
+                      <a:round/>
+                      <a:headEnd type="none" w="med" len="med"/>
+                      <a:tailEnd type="none" w="med" len="med"/>
+                    </a:lnL>
+                    <a:lnR w="12700" cap="flat" cmpd="sng" algn="ctr">
+                      <a:solidFill>
+                        <a:schemeClr val="tx1"/>
+                      </a:solidFill>
+                      <a:prstDash val="solid"/>
+                      <a:round/>
+                      <a:headEnd type="none" w="med" len="med"/>
+                      <a:tailEnd type="none" w="med" len="med"/>
+                    </a:lnR>
+                    <a:lnT w="12700" cap="flat" cmpd="sng" algn="ctr">
+                      <a:solidFill>
+                        <a:schemeClr val="tx1"/>
+                      </a:solidFill>
+                      <a:prstDash val="solid"/>
+                      <a:round/>
+                      <a:headEnd type="none" w="med" len="med"/>
+                      <a:tailEnd type="none" w="med" len="med"/>
+                    </a:lnT>
+                    <a:lnB w="12700" cap="flat" cmpd="sng" algn="ctr">
+                      <a:solidFill>
+                        <a:schemeClr val="tx1"/>
+                      </a:solidFill>
+                      <a:prstDash val="solid"/>
+                      <a:round/>
+                      <a:headEnd type="none" w="med" len="med"/>
+                      <a:tailEnd type="none" w="med" len="med"/>
+                    </a:lnB>
+                    <a:noFill/>
+                  </a:tcPr>
+                </a:tc>
+                <a:tc>
+                  <a:txBody>
+                    <a:bodyPr/>
+                    <a:lstStyle/>
+                    <a:p>
+                      <a:pPr algn="ctr" fontAlgn="ctr"/>
+                      <a:r>
+                        <a:rPr lang="en-SG" sz="1800" b="1" u="none" strike="noStrike">
+                          <a:effectLst/>
+                        </a:rPr>
+                        <a:t>Day Rate (￡)</a:t>
+                      </a:r>
+                      <a:endParaRPr lang="en-SG" sz="1800" b="1" i="0" u="none" strike="noStrike">
+                        <a:solidFill>
+                          <a:srgbClr val="000000"/>
+                        </a:solidFill>
+                        <a:effectLst/>
+                        <a:latin typeface="Calibri" panose="020F0502020204030204" pitchFamily="34" charset="0"/>
+                      </a:endParaRPr>
+                    </a:p>
+                  </a:txBody>
+                  <a:tcPr marL="11191" marR="11191" marT="11191" marB="0" anchor="ctr">
+                    <a:lnL w="12700" cap="flat" cmpd="sng" algn="ctr">
+                      <a:solidFill>
+                        <a:schemeClr val="tx1"/>
+                      </a:solidFill>
+                      <a:prstDash val="solid"/>
+                      <a:round/>
+                      <a:headEnd type="none" w="med" len="med"/>
+                      <a:tailEnd type="none" w="med" len="med"/>
+                    </a:lnL>
+                    <a:lnR w="12700" cap="flat" cmpd="sng" algn="ctr">
+                      <a:solidFill>
+                        <a:schemeClr val="tx1"/>
+                      </a:solidFill>
+                      <a:prstDash val="solid"/>
+                      <a:round/>
+                      <a:headEnd type="none" w="med" len="med"/>
+                      <a:tailEnd type="none" w="med" len="med"/>
+                    </a:lnR>
+                    <a:lnT w="12700" cap="flat" cmpd="sng" algn="ctr">
+                      <a:solidFill>
+                        <a:schemeClr val="tx1"/>
+                      </a:solidFill>
+                      <a:prstDash val="solid"/>
+                      <a:round/>
+                      <a:headEnd type="none" w="med" len="med"/>
+                      <a:tailEnd type="none" w="med" len="med"/>
+                    </a:lnT>
+                    <a:lnB w="12700" cap="flat" cmpd="sng" algn="ctr">
+                      <a:solidFill>
+                        <a:schemeClr val="tx1"/>
+                      </a:solidFill>
+                      <a:prstDash val="solid"/>
+                      <a:round/>
+                      <a:headEnd type="none" w="med" len="med"/>
+                      <a:tailEnd type="none" w="med" len="med"/>
+                    </a:lnB>
+                    <a:noFill/>
+                  </a:tcPr>
+                </a:tc>
+                <a:tc>
+                  <a:txBody>
+                    <a:bodyPr/>
+                    <a:lstStyle/>
+                    <a:p>
+                      <a:pPr algn="ctr" fontAlgn="ctr"/>
+                      <a:r>
+                        <a:rPr lang="en-SG" sz="1800" b="1" u="none" strike="noStrike">
+                          <a:effectLst/>
+                        </a:rPr>
+                        <a:t>No. of Days</a:t>
+                      </a:r>
+                      <a:endParaRPr lang="en-SG" sz="1800" b="1" i="0" u="none" strike="noStrike">
+                        <a:solidFill>
+                          <a:srgbClr val="000000"/>
+                        </a:solidFill>
+                        <a:effectLst/>
+                        <a:latin typeface="Calibri" panose="020F0502020204030204" pitchFamily="34" charset="0"/>
+                      </a:endParaRPr>
+                    </a:p>
+                  </a:txBody>
+                  <a:tcPr marL="11191" marR="11191" marT="11191" marB="0" anchor="ctr">
+                    <a:lnL w="12700" cap="flat" cmpd="sng" algn="ctr">
+                      <a:solidFill>
+                        <a:schemeClr val="tx1"/>
+                      </a:solidFill>
+                      <a:prstDash val="solid"/>
+                      <a:round/>
+                      <a:headEnd type="none" w="med" len="med"/>
+                      <a:tailEnd type="none" w="med" len="med"/>
+                    </a:lnL>
+                    <a:lnR w="12700" cap="flat" cmpd="sng" algn="ctr">
+                      <a:solidFill>
+                        <a:schemeClr val="tx1"/>
+                      </a:solidFill>
+                      <a:prstDash val="solid"/>
+                      <a:round/>
+                      <a:headEnd type="none" w="med" len="med"/>
+                      <a:tailEnd type="none" w="med" len="med"/>
+                    </a:lnR>
+                    <a:lnT w="12700" cap="flat" cmpd="sng" algn="ctr">
+                      <a:solidFill>
+                        <a:schemeClr val="tx1"/>
+                      </a:solidFill>
+                      <a:prstDash val="solid"/>
+                      <a:round/>
+                      <a:headEnd type="none" w="med" len="med"/>
+                      <a:tailEnd type="none" w="med" len="med"/>
+                    </a:lnT>
+                    <a:lnB w="12700" cap="flat" cmpd="sng" algn="ctr">
+                      <a:solidFill>
+                        <a:schemeClr val="tx1"/>
+                      </a:solidFill>
+                      <a:prstDash val="solid"/>
+                      <a:round/>
+                      <a:headEnd type="none" w="med" len="med"/>
+                      <a:tailEnd type="none" w="med" len="med"/>
+                    </a:lnB>
+                    <a:noFill/>
+                  </a:tcPr>
+                </a:tc>
+                <a:tc>
+                  <a:txBody>
+                    <a:bodyPr/>
+                    <a:lstStyle/>
+                    <a:p>
+                      <a:pPr algn="ctr" fontAlgn="ctr"/>
+                      <a:r>
+                        <a:rPr lang="en-SG" sz="1800" b="1" u="none" strike="noStrike" dirty="0">
+                          <a:effectLst/>
+                        </a:rPr>
+                        <a:t>Total Cost (￡)</a:t>
+                      </a:r>
+                      <a:endParaRPr lang="en-SG" sz="1800" b="1" i="0" u="none" strike="noStrike" dirty="0">
+                        <a:solidFill>
+                          <a:srgbClr val="000000"/>
+                        </a:solidFill>
+                        <a:effectLst/>
+                        <a:latin typeface="Calibri" panose="020F0502020204030204" pitchFamily="34" charset="0"/>
+                      </a:endParaRPr>
+                    </a:p>
+                  </a:txBody>
+                  <a:tcPr marL="11191" marR="11191" marT="11191" marB="0" anchor="ctr">
+                    <a:lnL w="12700" cap="flat" cmpd="sng" algn="ctr">
+                      <a:solidFill>
+                        <a:schemeClr val="tx1"/>
+                      </a:solidFill>
+                      <a:prstDash val="solid"/>
+                      <a:round/>
+                      <a:headEnd type="none" w="med" len="med"/>
+                      <a:tailEnd type="none" w="med" len="med"/>
+                    </a:lnL>
+                    <a:lnR w="12700" cap="flat" cmpd="sng" algn="ctr">
+                      <a:solidFill>
+                        <a:schemeClr val="tx1"/>
+                      </a:solidFill>
+                      <a:prstDash val="solid"/>
+                      <a:round/>
+                      <a:headEnd type="none" w="med" len="med"/>
+                      <a:tailEnd type="none" w="med" len="med"/>
+                    </a:lnR>
+                    <a:lnT w="12700" cap="flat" cmpd="sng" algn="ctr">
+                      <a:solidFill>
+                        <a:schemeClr val="tx1"/>
+                      </a:solidFill>
+                      <a:prstDash val="solid"/>
+                      <a:round/>
+                      <a:headEnd type="none" w="med" len="med"/>
+                      <a:tailEnd type="none" w="med" len="med"/>
+                    </a:lnT>
+                    <a:lnB w="12700" cap="flat" cmpd="sng" algn="ctr">
+                      <a:solidFill>
+                        <a:schemeClr val="tx1"/>
+                      </a:solidFill>
+                      <a:prstDash val="solid"/>
+                      <a:round/>
+                      <a:headEnd type="none" w="med" len="med"/>
+                      <a:tailEnd type="none" w="med" len="med"/>
+                    </a:lnB>
+                    <a:noFill/>
+                  </a:tcPr>
+                </a:tc>
+                <a:extLst>
+                  <a:ext uri="{0D108BD9-81ED-4DB2-BD59-A6C34878D82A}">
+                    <a16:rowId xmlns:a16="http://schemas.microsoft.com/office/drawing/2014/main" val="2203156797"/>
+                  </a:ext>
+                </a:extLst>
+              </a:tr>
+              <a:tr h="290978">
+                <a:tc>
+                  <a:txBody>
+                    <a:bodyPr/>
+                    <a:lstStyle/>
+                    <a:p>
+                      <a:pPr algn="l" fontAlgn="b"/>
+                      <a:r>
+                        <a:rPr lang="en-SG" sz="1800" u="none" strike="noStrike" dirty="0">
+                          <a:effectLst/>
+                        </a:rPr>
+                        <a:t>Project Manager</a:t>
+                      </a:r>
+                      <a:endParaRPr lang="en-SG" sz="1800" b="0" i="0" u="none" strike="noStrike" dirty="0">
+                        <a:solidFill>
+                          <a:srgbClr val="000000"/>
+                        </a:solidFill>
+                        <a:effectLst/>
+                        <a:latin typeface="Calibri" panose="020F0502020204030204" pitchFamily="34" charset="0"/>
+                      </a:endParaRPr>
+                    </a:p>
+                  </a:txBody>
+                  <a:tcPr marL="11191" marR="11191" marT="11191" marB="0" anchor="b">
+                    <a:lnL w="12700" cap="flat" cmpd="sng" algn="ctr">
+                      <a:solidFill>
+                        <a:schemeClr val="tx1"/>
+                      </a:solidFill>
+                      <a:prstDash val="solid"/>
+                      <a:round/>
+                      <a:headEnd type="none" w="med" len="med"/>
+                      <a:tailEnd type="none" w="med" len="med"/>
+                    </a:lnL>
+                    <a:lnR w="12700" cap="flat" cmpd="sng" algn="ctr">
+                      <a:solidFill>
+                        <a:schemeClr val="tx1"/>
+                      </a:solidFill>
+                      <a:prstDash val="solid"/>
+                      <a:round/>
+                      <a:headEnd type="none" w="med" len="med"/>
+                      <a:tailEnd type="none" w="med" len="med"/>
+                    </a:lnR>
+                    <a:lnT w="12700" cap="flat" cmpd="sng" algn="ctr">
+                      <a:solidFill>
+                        <a:schemeClr val="tx1"/>
+                      </a:solidFill>
+                      <a:prstDash val="solid"/>
+                      <a:round/>
+                      <a:headEnd type="none" w="med" len="med"/>
+                      <a:tailEnd type="none" w="med" len="med"/>
+                    </a:lnT>
+                    <a:lnB w="12700" cap="flat" cmpd="sng" algn="ctr">
+                      <a:solidFill>
+                        <a:schemeClr val="tx1"/>
+                      </a:solidFill>
+                      <a:prstDash val="solid"/>
+                      <a:round/>
+                      <a:headEnd type="none" w="med" len="med"/>
+                      <a:tailEnd type="none" w="med" len="med"/>
+                    </a:lnB>
+                    <a:noFill/>
+                  </a:tcPr>
+                </a:tc>
+                <a:tc>
+                  <a:txBody>
+                    <a:bodyPr/>
+                    <a:lstStyle/>
+                    <a:p>
+                      <a:pPr algn="r" fontAlgn="b"/>
+                      <a:r>
+                        <a:rPr lang="en-SG" sz="1800" u="none" strike="noStrike">
+                          <a:effectLst/>
+                        </a:rPr>
+                        <a:t>1</a:t>
+                      </a:r>
+                      <a:endParaRPr lang="en-SG" sz="1800" b="0" i="0" u="none" strike="noStrike">
+                        <a:solidFill>
+                          <a:srgbClr val="000000"/>
+                        </a:solidFill>
+                        <a:effectLst/>
+                        <a:latin typeface="Calibri" panose="020F0502020204030204" pitchFamily="34" charset="0"/>
+                      </a:endParaRPr>
+                    </a:p>
+                  </a:txBody>
+                  <a:tcPr marL="11191" marR="11191" marT="11191" marB="0" anchor="b">
+                    <a:lnL w="12700" cap="flat" cmpd="sng" algn="ctr">
+                      <a:solidFill>
+                        <a:schemeClr val="tx1"/>
+                      </a:solidFill>
+                      <a:prstDash val="solid"/>
+                      <a:round/>
+                      <a:headEnd type="none" w="med" len="med"/>
+                      <a:tailEnd type="none" w="med" len="med"/>
+                    </a:lnL>
+                    <a:lnR w="12700" cap="flat" cmpd="sng" algn="ctr">
+                      <a:solidFill>
+                        <a:schemeClr val="tx1"/>
+                      </a:solidFill>
+                      <a:prstDash val="solid"/>
+                      <a:round/>
+                      <a:headEnd type="none" w="med" len="med"/>
+                      <a:tailEnd type="none" w="med" len="med"/>
+                    </a:lnR>
+                    <a:lnT w="12700" cap="flat" cmpd="sng" algn="ctr">
+                      <a:solidFill>
+                        <a:schemeClr val="tx1"/>
+                      </a:solidFill>
+                      <a:prstDash val="solid"/>
+                      <a:round/>
+                      <a:headEnd type="none" w="med" len="med"/>
+                      <a:tailEnd type="none" w="med" len="med"/>
+                    </a:lnT>
+                    <a:lnB w="12700" cap="flat" cmpd="sng" algn="ctr">
+                      <a:solidFill>
+                        <a:schemeClr val="tx1"/>
+                      </a:solidFill>
+                      <a:prstDash val="solid"/>
+                      <a:round/>
+                      <a:headEnd type="none" w="med" len="med"/>
+                      <a:tailEnd type="none" w="med" len="med"/>
+                    </a:lnB>
+                    <a:noFill/>
+                  </a:tcPr>
+                </a:tc>
+                <a:tc>
+                  <a:txBody>
+                    <a:bodyPr/>
+                    <a:lstStyle/>
+                    <a:p>
+                      <a:pPr algn="r" fontAlgn="b"/>
+                      <a:r>
+                        <a:rPr lang="en-SG" sz="1800" u="none" strike="noStrike">
+                          <a:effectLst/>
+                        </a:rPr>
+                        <a:t>300</a:t>
+                      </a:r>
+                      <a:endParaRPr lang="en-SG" sz="1800" b="0" i="0" u="none" strike="noStrike">
+                        <a:solidFill>
+                          <a:srgbClr val="000000"/>
+                        </a:solidFill>
+                        <a:effectLst/>
+                        <a:latin typeface="Calibri" panose="020F0502020204030204" pitchFamily="34" charset="0"/>
+                      </a:endParaRPr>
+                    </a:p>
+                  </a:txBody>
+                  <a:tcPr marL="11191" marR="11191" marT="11191" marB="0" anchor="b">
+                    <a:lnL w="12700" cap="flat" cmpd="sng" algn="ctr">
+                      <a:solidFill>
+                        <a:schemeClr val="tx1"/>
+                      </a:solidFill>
+                      <a:prstDash val="solid"/>
+                      <a:round/>
+                      <a:headEnd type="none" w="med" len="med"/>
+                      <a:tailEnd type="none" w="med" len="med"/>
+                    </a:lnL>
+                    <a:lnR w="12700" cap="flat" cmpd="sng" algn="ctr">
+                      <a:solidFill>
+                        <a:schemeClr val="tx1"/>
+                      </a:solidFill>
+                      <a:prstDash val="solid"/>
+                      <a:round/>
+                      <a:headEnd type="none" w="med" len="med"/>
+                      <a:tailEnd type="none" w="med" len="med"/>
+                    </a:lnR>
+                    <a:lnT w="12700" cap="flat" cmpd="sng" algn="ctr">
+                      <a:solidFill>
+                        <a:schemeClr val="tx1"/>
+                      </a:solidFill>
+                      <a:prstDash val="solid"/>
+                      <a:round/>
+                      <a:headEnd type="none" w="med" len="med"/>
+                      <a:tailEnd type="none" w="med" len="med"/>
+                    </a:lnT>
+                    <a:lnB w="12700" cap="flat" cmpd="sng" algn="ctr">
+                      <a:solidFill>
+                        <a:schemeClr val="tx1"/>
+                      </a:solidFill>
+                      <a:prstDash val="solid"/>
+                      <a:round/>
+                      <a:headEnd type="none" w="med" len="med"/>
+                      <a:tailEnd type="none" w="med" len="med"/>
+                    </a:lnB>
+                    <a:noFill/>
+                  </a:tcPr>
+                </a:tc>
+                <a:tc>
+                  <a:txBody>
+                    <a:bodyPr/>
+                    <a:lstStyle/>
+                    <a:p>
+                      <a:pPr algn="r" fontAlgn="b"/>
+                      <a:r>
+                        <a:rPr lang="en-SG" sz="1800" u="none" strike="noStrike">
+                          <a:effectLst/>
+                        </a:rPr>
+                        <a:t>120</a:t>
+                      </a:r>
+                      <a:endParaRPr lang="en-SG" sz="1800" b="0" i="0" u="none" strike="noStrike">
+                        <a:solidFill>
+                          <a:srgbClr val="000000"/>
+                        </a:solidFill>
+                        <a:effectLst/>
+                        <a:latin typeface="Calibri" panose="020F0502020204030204" pitchFamily="34" charset="0"/>
+                      </a:endParaRPr>
+                    </a:p>
+                  </a:txBody>
+                  <a:tcPr marL="11191" marR="11191" marT="11191" marB="0" anchor="b">
+                    <a:lnL w="12700" cap="flat" cmpd="sng" algn="ctr">
+                      <a:solidFill>
+                        <a:schemeClr val="tx1"/>
+                      </a:solidFill>
+                      <a:prstDash val="solid"/>
+                      <a:round/>
+                      <a:headEnd type="none" w="med" len="med"/>
+                      <a:tailEnd type="none" w="med" len="med"/>
+                    </a:lnL>
+                    <a:lnR w="12700" cap="flat" cmpd="sng" algn="ctr">
+                      <a:solidFill>
+                        <a:schemeClr val="tx1"/>
+                      </a:solidFill>
+                      <a:prstDash val="solid"/>
+                      <a:round/>
+                      <a:headEnd type="none" w="med" len="med"/>
+                      <a:tailEnd type="none" w="med" len="med"/>
+                    </a:lnR>
+                    <a:lnT w="12700" cap="flat" cmpd="sng" algn="ctr">
+                      <a:solidFill>
+                        <a:schemeClr val="tx1"/>
+                      </a:solidFill>
+                      <a:prstDash val="solid"/>
+                      <a:round/>
+                      <a:headEnd type="none" w="med" len="med"/>
+                      <a:tailEnd type="none" w="med" len="med"/>
+                    </a:lnT>
+                    <a:lnB w="12700" cap="flat" cmpd="sng" algn="ctr">
+                      <a:solidFill>
+                        <a:schemeClr val="tx1"/>
+                      </a:solidFill>
+                      <a:prstDash val="solid"/>
+                      <a:round/>
+                      <a:headEnd type="none" w="med" len="med"/>
+                      <a:tailEnd type="none" w="med" len="med"/>
+                    </a:lnB>
+                    <a:noFill/>
+                  </a:tcPr>
+                </a:tc>
+                <a:tc>
+                  <a:txBody>
+                    <a:bodyPr/>
+                    <a:lstStyle/>
+                    <a:p>
+                      <a:pPr algn="r" fontAlgn="b"/>
+                      <a:r>
+                        <a:rPr lang="en-SG" sz="1800" u="none" strike="noStrike">
+                          <a:effectLst/>
+                        </a:rPr>
+                        <a:t>36000</a:t>
+                      </a:r>
+                      <a:endParaRPr lang="en-SG" sz="1800" b="0" i="0" u="none" strike="noStrike">
+                        <a:solidFill>
+                          <a:srgbClr val="000000"/>
+                        </a:solidFill>
+                        <a:effectLst/>
+                        <a:latin typeface="Calibri" panose="020F0502020204030204" pitchFamily="34" charset="0"/>
+                      </a:endParaRPr>
+                    </a:p>
+                  </a:txBody>
+                  <a:tcPr marL="11191" marR="11191" marT="11191" marB="0" anchor="b">
+                    <a:lnL w="12700" cap="flat" cmpd="sng" algn="ctr">
+                      <a:solidFill>
+                        <a:schemeClr val="tx1"/>
+                      </a:solidFill>
+                      <a:prstDash val="solid"/>
+                      <a:round/>
+                      <a:headEnd type="none" w="med" len="med"/>
+                      <a:tailEnd type="none" w="med" len="med"/>
+                    </a:lnL>
+                    <a:lnR w="12700" cap="flat" cmpd="sng" algn="ctr">
+                      <a:solidFill>
+                        <a:schemeClr val="tx1"/>
+                      </a:solidFill>
+                      <a:prstDash val="solid"/>
+                      <a:round/>
+                      <a:headEnd type="none" w="med" len="med"/>
+                      <a:tailEnd type="none" w="med" len="med"/>
+                    </a:lnR>
+                    <a:lnT w="12700" cap="flat" cmpd="sng" algn="ctr">
+                      <a:solidFill>
+                        <a:schemeClr val="tx1"/>
+                      </a:solidFill>
+                      <a:prstDash val="solid"/>
+                      <a:round/>
+                      <a:headEnd type="none" w="med" len="med"/>
+                      <a:tailEnd type="none" w="med" len="med"/>
+                    </a:lnT>
+                    <a:lnB w="12700" cap="flat" cmpd="sng" algn="ctr">
+                      <a:solidFill>
+                        <a:schemeClr val="tx1"/>
+                      </a:solidFill>
+                      <a:prstDash val="solid"/>
+                      <a:round/>
+                      <a:headEnd type="none" w="med" len="med"/>
+                      <a:tailEnd type="none" w="med" len="med"/>
+                    </a:lnB>
+                    <a:noFill/>
+                  </a:tcPr>
+                </a:tc>
+                <a:extLst>
+                  <a:ext uri="{0D108BD9-81ED-4DB2-BD59-A6C34878D82A}">
+                    <a16:rowId xmlns:a16="http://schemas.microsoft.com/office/drawing/2014/main" val="4041681687"/>
+                  </a:ext>
+                </a:extLst>
+              </a:tr>
+              <a:tr h="290978">
+                <a:tc>
+                  <a:txBody>
+                    <a:bodyPr/>
+                    <a:lstStyle/>
+                    <a:p>
+                      <a:pPr algn="l" fontAlgn="b"/>
+                      <a:r>
+                        <a:rPr lang="en-SG" sz="1800" u="none" strike="noStrike" dirty="0">
+                          <a:effectLst/>
+                        </a:rPr>
+                        <a:t>Data Engineer</a:t>
+                      </a:r>
+                      <a:endParaRPr lang="en-SG" sz="1800" b="0" i="0" u="none" strike="noStrike" dirty="0">
+                        <a:solidFill>
+                          <a:srgbClr val="000000"/>
+                        </a:solidFill>
+                        <a:effectLst/>
+                        <a:latin typeface="Calibri" panose="020F0502020204030204" pitchFamily="34" charset="0"/>
+                      </a:endParaRPr>
+                    </a:p>
+                  </a:txBody>
+                  <a:tcPr marL="11191" marR="11191" marT="11191" marB="0" anchor="b">
+                    <a:lnL w="12700" cap="flat" cmpd="sng" algn="ctr">
+                      <a:solidFill>
+                        <a:schemeClr val="tx1"/>
+                      </a:solidFill>
+                      <a:prstDash val="solid"/>
+                      <a:round/>
+                      <a:headEnd type="none" w="med" len="med"/>
+                      <a:tailEnd type="none" w="med" len="med"/>
+                    </a:lnL>
+                    <a:lnR w="12700" cap="flat" cmpd="sng" algn="ctr">
+                      <a:solidFill>
+                        <a:schemeClr val="tx1"/>
+                      </a:solidFill>
+                      <a:prstDash val="solid"/>
+                      <a:round/>
+                      <a:headEnd type="none" w="med" len="med"/>
+                      <a:tailEnd type="none" w="med" len="med"/>
+                    </a:lnR>
+                    <a:lnT w="12700" cap="flat" cmpd="sng" algn="ctr">
+                      <a:solidFill>
+                        <a:schemeClr val="tx1"/>
+                      </a:solidFill>
+                      <a:prstDash val="solid"/>
+                      <a:round/>
+                      <a:headEnd type="none" w="med" len="med"/>
+                      <a:tailEnd type="none" w="med" len="med"/>
+                    </a:lnT>
+                    <a:lnB w="12700" cap="flat" cmpd="sng" algn="ctr">
+                      <a:solidFill>
+                        <a:schemeClr val="tx1"/>
+                      </a:solidFill>
+                      <a:prstDash val="solid"/>
+                      <a:round/>
+                      <a:headEnd type="none" w="med" len="med"/>
+                      <a:tailEnd type="none" w="med" len="med"/>
+                    </a:lnB>
+                    <a:noFill/>
+                  </a:tcPr>
+                </a:tc>
+                <a:tc>
+                  <a:txBody>
+                    <a:bodyPr/>
+                    <a:lstStyle/>
+                    <a:p>
+                      <a:pPr algn="r" fontAlgn="b"/>
+                      <a:r>
+                        <a:rPr lang="en-SG" sz="1800" u="none" strike="noStrike" dirty="0">
+                          <a:effectLst/>
+                        </a:rPr>
+                        <a:t>1</a:t>
+                      </a:r>
+                      <a:endParaRPr lang="en-SG" sz="1800" b="0" i="0" u="none" strike="noStrike" dirty="0">
+                        <a:solidFill>
+                          <a:srgbClr val="000000"/>
+                        </a:solidFill>
+                        <a:effectLst/>
+                        <a:latin typeface="Calibri" panose="020F0502020204030204" pitchFamily="34" charset="0"/>
+                      </a:endParaRPr>
+                    </a:p>
+                  </a:txBody>
+                  <a:tcPr marL="11191" marR="11191" marT="11191" marB="0" anchor="b">
+                    <a:lnL w="12700" cap="flat" cmpd="sng" algn="ctr">
+                      <a:solidFill>
+                        <a:schemeClr val="tx1"/>
+                      </a:solidFill>
+                      <a:prstDash val="solid"/>
+                      <a:round/>
+                      <a:headEnd type="none" w="med" len="med"/>
+                      <a:tailEnd type="none" w="med" len="med"/>
+                    </a:lnL>
+                    <a:lnR w="12700" cap="flat" cmpd="sng" algn="ctr">
+                      <a:solidFill>
+                        <a:schemeClr val="tx1"/>
+                      </a:solidFill>
+                      <a:prstDash val="solid"/>
+                      <a:round/>
+                      <a:headEnd type="none" w="med" len="med"/>
+                      <a:tailEnd type="none" w="med" len="med"/>
+                    </a:lnR>
+                    <a:lnT w="12700" cap="flat" cmpd="sng" algn="ctr">
+                      <a:solidFill>
+                        <a:schemeClr val="tx1"/>
+                      </a:solidFill>
+                      <a:prstDash val="solid"/>
+                      <a:round/>
+                      <a:headEnd type="none" w="med" len="med"/>
+                      <a:tailEnd type="none" w="med" len="med"/>
+                    </a:lnT>
+                    <a:lnB w="12700" cap="flat" cmpd="sng" algn="ctr">
+                      <a:solidFill>
+                        <a:schemeClr val="tx1"/>
+                      </a:solidFill>
+                      <a:prstDash val="solid"/>
+                      <a:round/>
+                      <a:headEnd type="none" w="med" len="med"/>
+                      <a:tailEnd type="none" w="med" len="med"/>
+                    </a:lnB>
+                    <a:noFill/>
+                  </a:tcPr>
+                </a:tc>
+                <a:tc>
+                  <a:txBody>
+                    <a:bodyPr/>
+                    <a:lstStyle/>
+                    <a:p>
+                      <a:pPr algn="r" fontAlgn="b"/>
+                      <a:r>
+                        <a:rPr lang="en-SG" sz="1800" u="none" strike="noStrike">
+                          <a:effectLst/>
+                        </a:rPr>
+                        <a:t>250</a:t>
+                      </a:r>
+                      <a:endParaRPr lang="en-SG" sz="1800" b="0" i="0" u="none" strike="noStrike">
+                        <a:solidFill>
+                          <a:srgbClr val="000000"/>
+                        </a:solidFill>
+                        <a:effectLst/>
+                        <a:latin typeface="Calibri" panose="020F0502020204030204" pitchFamily="34" charset="0"/>
+                      </a:endParaRPr>
+                    </a:p>
+                  </a:txBody>
+                  <a:tcPr marL="11191" marR="11191" marT="11191" marB="0" anchor="b">
+                    <a:lnL w="12700" cap="flat" cmpd="sng" algn="ctr">
+                      <a:solidFill>
+                        <a:schemeClr val="tx1"/>
+                      </a:solidFill>
+                      <a:prstDash val="solid"/>
+                      <a:round/>
+                      <a:headEnd type="none" w="med" len="med"/>
+                      <a:tailEnd type="none" w="med" len="med"/>
+                    </a:lnL>
+                    <a:lnR w="12700" cap="flat" cmpd="sng" algn="ctr">
+                      <a:solidFill>
+                        <a:schemeClr val="tx1"/>
+                      </a:solidFill>
+                      <a:prstDash val="solid"/>
+                      <a:round/>
+                      <a:headEnd type="none" w="med" len="med"/>
+                      <a:tailEnd type="none" w="med" len="med"/>
+                    </a:lnR>
+                    <a:lnT w="12700" cap="flat" cmpd="sng" algn="ctr">
+                      <a:solidFill>
+                        <a:schemeClr val="tx1"/>
+                      </a:solidFill>
+                      <a:prstDash val="solid"/>
+                      <a:round/>
+                      <a:headEnd type="none" w="med" len="med"/>
+                      <a:tailEnd type="none" w="med" len="med"/>
+                    </a:lnT>
+                    <a:lnB w="12700" cap="flat" cmpd="sng" algn="ctr">
+                      <a:solidFill>
+                        <a:schemeClr val="tx1"/>
+                      </a:solidFill>
+                      <a:prstDash val="solid"/>
+                      <a:round/>
+                      <a:headEnd type="none" w="med" len="med"/>
+                      <a:tailEnd type="none" w="med" len="med"/>
+                    </a:lnB>
+                    <a:noFill/>
+                  </a:tcPr>
+                </a:tc>
+                <a:tc>
+                  <a:txBody>
+                    <a:bodyPr/>
+                    <a:lstStyle/>
+                    <a:p>
+                      <a:pPr algn="r" fontAlgn="b"/>
+                      <a:r>
+                        <a:rPr lang="en-SG" sz="1800" u="none" strike="noStrike">
+                          <a:effectLst/>
+                        </a:rPr>
+                        <a:t>90</a:t>
+                      </a:r>
+                      <a:endParaRPr lang="en-SG" sz="1800" b="0" i="0" u="none" strike="noStrike">
+                        <a:solidFill>
+                          <a:srgbClr val="000000"/>
+                        </a:solidFill>
+                        <a:effectLst/>
+                        <a:latin typeface="Calibri" panose="020F0502020204030204" pitchFamily="34" charset="0"/>
+                      </a:endParaRPr>
+                    </a:p>
+                  </a:txBody>
+                  <a:tcPr marL="11191" marR="11191" marT="11191" marB="0" anchor="b">
+                    <a:lnL w="12700" cap="flat" cmpd="sng" algn="ctr">
+                      <a:solidFill>
+                        <a:schemeClr val="tx1"/>
+                      </a:solidFill>
+                      <a:prstDash val="solid"/>
+                      <a:round/>
+                      <a:headEnd type="none" w="med" len="med"/>
+                      <a:tailEnd type="none" w="med" len="med"/>
+                    </a:lnL>
+                    <a:lnR w="12700" cap="flat" cmpd="sng" algn="ctr">
+                      <a:solidFill>
+                        <a:schemeClr val="tx1"/>
+                      </a:solidFill>
+                      <a:prstDash val="solid"/>
+                      <a:round/>
+                      <a:headEnd type="none" w="med" len="med"/>
+                      <a:tailEnd type="none" w="med" len="med"/>
+                    </a:lnR>
+                    <a:lnT w="12700" cap="flat" cmpd="sng" algn="ctr">
+                      <a:solidFill>
+                        <a:schemeClr val="tx1"/>
+                      </a:solidFill>
+                      <a:prstDash val="solid"/>
+                      <a:round/>
+                      <a:headEnd type="none" w="med" len="med"/>
+                      <a:tailEnd type="none" w="med" len="med"/>
+                    </a:lnT>
+                    <a:lnB w="12700" cap="flat" cmpd="sng" algn="ctr">
+                      <a:solidFill>
+                        <a:schemeClr val="tx1"/>
+                      </a:solidFill>
+                      <a:prstDash val="solid"/>
+                      <a:round/>
+                      <a:headEnd type="none" w="med" len="med"/>
+                      <a:tailEnd type="none" w="med" len="med"/>
+                    </a:lnB>
+                    <a:noFill/>
+                  </a:tcPr>
+                </a:tc>
+                <a:tc>
+                  <a:txBody>
+                    <a:bodyPr/>
+                    <a:lstStyle/>
+                    <a:p>
+                      <a:pPr algn="r" fontAlgn="b"/>
+                      <a:r>
+                        <a:rPr lang="en-SG" sz="1800" u="none" strike="noStrike">
+                          <a:effectLst/>
+                        </a:rPr>
+                        <a:t>22500</a:t>
+                      </a:r>
+                      <a:endParaRPr lang="en-SG" sz="1800" b="0" i="0" u="none" strike="noStrike">
+                        <a:solidFill>
+                          <a:srgbClr val="000000"/>
+                        </a:solidFill>
+                        <a:effectLst/>
+                        <a:latin typeface="Calibri" panose="020F0502020204030204" pitchFamily="34" charset="0"/>
+                      </a:endParaRPr>
+                    </a:p>
+                  </a:txBody>
+                  <a:tcPr marL="11191" marR="11191" marT="11191" marB="0" anchor="b">
+                    <a:lnL w="12700" cap="flat" cmpd="sng" algn="ctr">
+                      <a:solidFill>
+                        <a:schemeClr val="tx1"/>
+                      </a:solidFill>
+                      <a:prstDash val="solid"/>
+                      <a:round/>
+                      <a:headEnd type="none" w="med" len="med"/>
+                      <a:tailEnd type="none" w="med" len="med"/>
+                    </a:lnL>
+                    <a:lnR w="12700" cap="flat" cmpd="sng" algn="ctr">
+                      <a:solidFill>
+                        <a:schemeClr val="tx1"/>
+                      </a:solidFill>
+                      <a:prstDash val="solid"/>
+                      <a:round/>
+                      <a:headEnd type="none" w="med" len="med"/>
+                      <a:tailEnd type="none" w="med" len="med"/>
+                    </a:lnR>
+                    <a:lnT w="12700" cap="flat" cmpd="sng" algn="ctr">
+                      <a:solidFill>
+                        <a:schemeClr val="tx1"/>
+                      </a:solidFill>
+                      <a:prstDash val="solid"/>
+                      <a:round/>
+                      <a:headEnd type="none" w="med" len="med"/>
+                      <a:tailEnd type="none" w="med" len="med"/>
+                    </a:lnT>
+                    <a:lnB w="12700" cap="flat" cmpd="sng" algn="ctr">
+                      <a:solidFill>
+                        <a:schemeClr val="tx1"/>
+                      </a:solidFill>
+                      <a:prstDash val="solid"/>
+                      <a:round/>
+                      <a:headEnd type="none" w="med" len="med"/>
+                      <a:tailEnd type="none" w="med" len="med"/>
+                    </a:lnB>
+                    <a:noFill/>
+                  </a:tcPr>
+                </a:tc>
+                <a:extLst>
+                  <a:ext uri="{0D108BD9-81ED-4DB2-BD59-A6C34878D82A}">
+                    <a16:rowId xmlns:a16="http://schemas.microsoft.com/office/drawing/2014/main" val="2905166694"/>
+                  </a:ext>
+                </a:extLst>
+              </a:tr>
+              <a:tr h="290978">
+                <a:tc>
+                  <a:txBody>
+                    <a:bodyPr/>
+                    <a:lstStyle/>
+                    <a:p>
+                      <a:pPr algn="l" fontAlgn="b"/>
+                      <a:r>
+                        <a:rPr lang="en-SG" sz="1800" u="none" strike="noStrike">
+                          <a:effectLst/>
+                        </a:rPr>
+                        <a:t>Geospatial Data Analyst</a:t>
+                      </a:r>
+                      <a:endParaRPr lang="en-SG" sz="1800" b="0" i="0" u="none" strike="noStrike">
+                        <a:solidFill>
+                          <a:srgbClr val="000000"/>
+                        </a:solidFill>
+                        <a:effectLst/>
+                        <a:latin typeface="Calibri" panose="020F0502020204030204" pitchFamily="34" charset="0"/>
+                      </a:endParaRPr>
+                    </a:p>
+                  </a:txBody>
+                  <a:tcPr marL="11191" marR="11191" marT="11191" marB="0" anchor="b">
+                    <a:lnL w="12700" cap="flat" cmpd="sng" algn="ctr">
+                      <a:solidFill>
+                        <a:schemeClr val="tx1"/>
+                      </a:solidFill>
+                      <a:prstDash val="solid"/>
+                      <a:round/>
+                      <a:headEnd type="none" w="med" len="med"/>
+                      <a:tailEnd type="none" w="med" len="med"/>
+                    </a:lnL>
+                    <a:lnR w="12700" cap="flat" cmpd="sng" algn="ctr">
+                      <a:solidFill>
+                        <a:schemeClr val="tx1"/>
+                      </a:solidFill>
+                      <a:prstDash val="solid"/>
+                      <a:round/>
+                      <a:headEnd type="none" w="med" len="med"/>
+                      <a:tailEnd type="none" w="med" len="med"/>
+                    </a:lnR>
+                    <a:lnT w="12700" cap="flat" cmpd="sng" algn="ctr">
+                      <a:solidFill>
+                        <a:schemeClr val="tx1"/>
+                      </a:solidFill>
+                      <a:prstDash val="solid"/>
+                      <a:round/>
+                      <a:headEnd type="none" w="med" len="med"/>
+                      <a:tailEnd type="none" w="med" len="med"/>
+                    </a:lnT>
+                    <a:lnB w="12700" cap="flat" cmpd="sng" algn="ctr">
+                      <a:solidFill>
+                        <a:schemeClr val="tx1"/>
+                      </a:solidFill>
+                      <a:prstDash val="solid"/>
+                      <a:round/>
+                      <a:headEnd type="none" w="med" len="med"/>
+                      <a:tailEnd type="none" w="med" len="med"/>
+                    </a:lnB>
+                    <a:noFill/>
+                  </a:tcPr>
+                </a:tc>
+                <a:tc>
+                  <a:txBody>
+                    <a:bodyPr/>
+                    <a:lstStyle/>
+                    <a:p>
+                      <a:pPr algn="r" fontAlgn="b"/>
+                      <a:r>
+                        <a:rPr lang="en-SG" sz="1800" u="none" strike="noStrike">
+                          <a:effectLst/>
+                        </a:rPr>
+                        <a:t>2</a:t>
+                      </a:r>
+                      <a:endParaRPr lang="en-SG" sz="1800" b="0" i="0" u="none" strike="noStrike">
+                        <a:solidFill>
+                          <a:srgbClr val="000000"/>
+                        </a:solidFill>
+                        <a:effectLst/>
+                        <a:latin typeface="Calibri" panose="020F0502020204030204" pitchFamily="34" charset="0"/>
+                      </a:endParaRPr>
+                    </a:p>
+                  </a:txBody>
+                  <a:tcPr marL="11191" marR="11191" marT="11191" marB="0" anchor="b">
+                    <a:lnL w="12700" cap="flat" cmpd="sng" algn="ctr">
+                      <a:solidFill>
+                        <a:schemeClr val="tx1"/>
+                      </a:solidFill>
+                      <a:prstDash val="solid"/>
+                      <a:round/>
+                      <a:headEnd type="none" w="med" len="med"/>
+                      <a:tailEnd type="none" w="med" len="med"/>
+                    </a:lnL>
+                    <a:lnR w="12700" cap="flat" cmpd="sng" algn="ctr">
+                      <a:solidFill>
+                        <a:schemeClr val="tx1"/>
+                      </a:solidFill>
+                      <a:prstDash val="solid"/>
+                      <a:round/>
+                      <a:headEnd type="none" w="med" len="med"/>
+                      <a:tailEnd type="none" w="med" len="med"/>
+                    </a:lnR>
+                    <a:lnT w="12700" cap="flat" cmpd="sng" algn="ctr">
+                      <a:solidFill>
+                        <a:schemeClr val="tx1"/>
+                      </a:solidFill>
+                      <a:prstDash val="solid"/>
+                      <a:round/>
+                      <a:headEnd type="none" w="med" len="med"/>
+                      <a:tailEnd type="none" w="med" len="med"/>
+                    </a:lnT>
+                    <a:lnB w="12700" cap="flat" cmpd="sng" algn="ctr">
+                      <a:solidFill>
+                        <a:schemeClr val="tx1"/>
+                      </a:solidFill>
+                      <a:prstDash val="solid"/>
+                      <a:round/>
+                      <a:headEnd type="none" w="med" len="med"/>
+                      <a:tailEnd type="none" w="med" len="med"/>
+                    </a:lnB>
+                    <a:noFill/>
+                  </a:tcPr>
+                </a:tc>
+                <a:tc>
+                  <a:txBody>
+                    <a:bodyPr/>
+                    <a:lstStyle/>
+                    <a:p>
+                      <a:pPr algn="r" fontAlgn="b"/>
+                      <a:r>
+                        <a:rPr lang="en-SG" sz="1800" u="none" strike="noStrike">
+                          <a:effectLst/>
+                        </a:rPr>
+                        <a:t>225</a:t>
+                      </a:r>
+                      <a:endParaRPr lang="en-SG" sz="1800" b="0" i="0" u="none" strike="noStrike">
+                        <a:solidFill>
+                          <a:srgbClr val="000000"/>
+                        </a:solidFill>
+                        <a:effectLst/>
+                        <a:latin typeface="Calibri" panose="020F0502020204030204" pitchFamily="34" charset="0"/>
+                      </a:endParaRPr>
+                    </a:p>
+                  </a:txBody>
+                  <a:tcPr marL="11191" marR="11191" marT="11191" marB="0" anchor="b">
+                    <a:lnL w="12700" cap="flat" cmpd="sng" algn="ctr">
+                      <a:solidFill>
+                        <a:schemeClr val="tx1"/>
+                      </a:solidFill>
+                      <a:prstDash val="solid"/>
+                      <a:round/>
+                      <a:headEnd type="none" w="med" len="med"/>
+                      <a:tailEnd type="none" w="med" len="med"/>
+                    </a:lnL>
+                    <a:lnR w="12700" cap="flat" cmpd="sng" algn="ctr">
+                      <a:solidFill>
+                        <a:schemeClr val="tx1"/>
+                      </a:solidFill>
+                      <a:prstDash val="solid"/>
+                      <a:round/>
+                      <a:headEnd type="none" w="med" len="med"/>
+                      <a:tailEnd type="none" w="med" len="med"/>
+                    </a:lnR>
+                    <a:lnT w="12700" cap="flat" cmpd="sng" algn="ctr">
+                      <a:solidFill>
+                        <a:schemeClr val="tx1"/>
+                      </a:solidFill>
+                      <a:prstDash val="solid"/>
+                      <a:round/>
+                      <a:headEnd type="none" w="med" len="med"/>
+                      <a:tailEnd type="none" w="med" len="med"/>
+                    </a:lnT>
+                    <a:lnB w="12700" cap="flat" cmpd="sng" algn="ctr">
+                      <a:solidFill>
+                        <a:schemeClr val="tx1"/>
+                      </a:solidFill>
+                      <a:prstDash val="solid"/>
+                      <a:round/>
+                      <a:headEnd type="none" w="med" len="med"/>
+                      <a:tailEnd type="none" w="med" len="med"/>
+                    </a:lnB>
+                    <a:noFill/>
+                  </a:tcPr>
+                </a:tc>
+                <a:tc>
+                  <a:txBody>
+                    <a:bodyPr/>
+                    <a:lstStyle/>
+                    <a:p>
+                      <a:pPr algn="r" fontAlgn="b"/>
+                      <a:r>
+                        <a:rPr lang="en-SG" sz="1800" u="none" strike="noStrike">
+                          <a:effectLst/>
+                        </a:rPr>
+                        <a:t>90</a:t>
+                      </a:r>
+                      <a:endParaRPr lang="en-SG" sz="1800" b="0" i="0" u="none" strike="noStrike">
+                        <a:solidFill>
+                          <a:srgbClr val="000000"/>
+                        </a:solidFill>
+                        <a:effectLst/>
+                        <a:latin typeface="Calibri" panose="020F0502020204030204" pitchFamily="34" charset="0"/>
+                      </a:endParaRPr>
+                    </a:p>
+                  </a:txBody>
+                  <a:tcPr marL="11191" marR="11191" marT="11191" marB="0" anchor="b">
+                    <a:lnL w="12700" cap="flat" cmpd="sng" algn="ctr">
+                      <a:solidFill>
+                        <a:schemeClr val="tx1"/>
+                      </a:solidFill>
+                      <a:prstDash val="solid"/>
+                      <a:round/>
+                      <a:headEnd type="none" w="med" len="med"/>
+                      <a:tailEnd type="none" w="med" len="med"/>
+                    </a:lnL>
+                    <a:lnR w="12700" cap="flat" cmpd="sng" algn="ctr">
+                      <a:solidFill>
+                        <a:schemeClr val="tx1"/>
+                      </a:solidFill>
+                      <a:prstDash val="solid"/>
+                      <a:round/>
+                      <a:headEnd type="none" w="med" len="med"/>
+                      <a:tailEnd type="none" w="med" len="med"/>
+                    </a:lnR>
+                    <a:lnT w="12700" cap="flat" cmpd="sng" algn="ctr">
+                      <a:solidFill>
+                        <a:schemeClr val="tx1"/>
+                      </a:solidFill>
+                      <a:prstDash val="solid"/>
+                      <a:round/>
+                      <a:headEnd type="none" w="med" len="med"/>
+                      <a:tailEnd type="none" w="med" len="med"/>
+                    </a:lnT>
+                    <a:lnB w="12700" cap="flat" cmpd="sng" algn="ctr">
+                      <a:solidFill>
+                        <a:schemeClr val="tx1"/>
+                      </a:solidFill>
+                      <a:prstDash val="solid"/>
+                      <a:round/>
+                      <a:headEnd type="none" w="med" len="med"/>
+                      <a:tailEnd type="none" w="med" len="med"/>
+                    </a:lnB>
+                    <a:noFill/>
+                  </a:tcPr>
+                </a:tc>
+                <a:tc>
+                  <a:txBody>
+                    <a:bodyPr/>
+                    <a:lstStyle/>
+                    <a:p>
+                      <a:pPr algn="r" fontAlgn="b"/>
+                      <a:r>
+                        <a:rPr lang="en-SG" sz="1800" u="none" strike="noStrike">
+                          <a:effectLst/>
+                        </a:rPr>
+                        <a:t>40500</a:t>
+                      </a:r>
+                      <a:endParaRPr lang="en-SG" sz="1800" b="0" i="0" u="none" strike="noStrike">
+                        <a:solidFill>
+                          <a:srgbClr val="000000"/>
+                        </a:solidFill>
+                        <a:effectLst/>
+                        <a:latin typeface="Calibri" panose="020F0502020204030204" pitchFamily="34" charset="0"/>
+                      </a:endParaRPr>
+                    </a:p>
+                  </a:txBody>
+                  <a:tcPr marL="11191" marR="11191" marT="11191" marB="0" anchor="b">
+                    <a:lnL w="12700" cap="flat" cmpd="sng" algn="ctr">
+                      <a:solidFill>
+                        <a:schemeClr val="tx1"/>
+                      </a:solidFill>
+                      <a:prstDash val="solid"/>
+                      <a:round/>
+                      <a:headEnd type="none" w="med" len="med"/>
+                      <a:tailEnd type="none" w="med" len="med"/>
+                    </a:lnL>
+                    <a:lnR w="12700" cap="flat" cmpd="sng" algn="ctr">
+                      <a:solidFill>
+                        <a:schemeClr val="tx1"/>
+                      </a:solidFill>
+                      <a:prstDash val="solid"/>
+                      <a:round/>
+                      <a:headEnd type="none" w="med" len="med"/>
+                      <a:tailEnd type="none" w="med" len="med"/>
+                    </a:lnR>
+                    <a:lnT w="12700" cap="flat" cmpd="sng" algn="ctr">
+                      <a:solidFill>
+                        <a:schemeClr val="tx1"/>
+                      </a:solidFill>
+                      <a:prstDash val="solid"/>
+                      <a:round/>
+                      <a:headEnd type="none" w="med" len="med"/>
+                      <a:tailEnd type="none" w="med" len="med"/>
+                    </a:lnT>
+                    <a:lnB w="12700" cap="flat" cmpd="sng" algn="ctr">
+                      <a:solidFill>
+                        <a:schemeClr val="tx1"/>
+                      </a:solidFill>
+                      <a:prstDash val="solid"/>
+                      <a:round/>
+                      <a:headEnd type="none" w="med" len="med"/>
+                      <a:tailEnd type="none" w="med" len="med"/>
+                    </a:lnB>
+                    <a:noFill/>
+                  </a:tcPr>
+                </a:tc>
+                <a:extLst>
+                  <a:ext uri="{0D108BD9-81ED-4DB2-BD59-A6C34878D82A}">
+                    <a16:rowId xmlns:a16="http://schemas.microsoft.com/office/drawing/2014/main" val="3294696368"/>
+                  </a:ext>
+                </a:extLst>
+              </a:tr>
+              <a:tr h="290978">
+                <a:tc>
+                  <a:txBody>
+                    <a:bodyPr/>
+                    <a:lstStyle/>
+                    <a:p>
+                      <a:pPr algn="l" fontAlgn="b"/>
+                      <a:r>
+                        <a:rPr lang="en-SG" sz="1800" u="none" strike="noStrike">
+                          <a:effectLst/>
+                        </a:rPr>
+                        <a:t>Environmental Scientist</a:t>
+                      </a:r>
+                      <a:endParaRPr lang="en-SG" sz="1800" b="0" i="0" u="none" strike="noStrike">
+                        <a:solidFill>
+                          <a:srgbClr val="000000"/>
+                        </a:solidFill>
+                        <a:effectLst/>
+                        <a:latin typeface="Calibri" panose="020F0502020204030204" pitchFamily="34" charset="0"/>
+                      </a:endParaRPr>
+                    </a:p>
+                  </a:txBody>
+                  <a:tcPr marL="11191" marR="11191" marT="11191" marB="0" anchor="b">
+                    <a:lnL w="12700" cap="flat" cmpd="sng" algn="ctr">
+                      <a:solidFill>
+                        <a:schemeClr val="tx1"/>
+                      </a:solidFill>
+                      <a:prstDash val="solid"/>
+                      <a:round/>
+                      <a:headEnd type="none" w="med" len="med"/>
+                      <a:tailEnd type="none" w="med" len="med"/>
+                    </a:lnL>
+                    <a:lnR w="12700" cap="flat" cmpd="sng" algn="ctr">
+                      <a:solidFill>
+                        <a:schemeClr val="tx1"/>
+                      </a:solidFill>
+                      <a:prstDash val="solid"/>
+                      <a:round/>
+                      <a:headEnd type="none" w="med" len="med"/>
+                      <a:tailEnd type="none" w="med" len="med"/>
+                    </a:lnR>
+                    <a:lnT w="12700" cap="flat" cmpd="sng" algn="ctr">
+                      <a:solidFill>
+                        <a:schemeClr val="tx1"/>
+                      </a:solidFill>
+                      <a:prstDash val="solid"/>
+                      <a:round/>
+                      <a:headEnd type="none" w="med" len="med"/>
+                      <a:tailEnd type="none" w="med" len="med"/>
+                    </a:lnT>
+                    <a:lnB w="12700" cap="flat" cmpd="sng" algn="ctr">
+                      <a:solidFill>
+                        <a:schemeClr val="tx1"/>
+                      </a:solidFill>
+                      <a:prstDash val="solid"/>
+                      <a:round/>
+                      <a:headEnd type="none" w="med" len="med"/>
+                      <a:tailEnd type="none" w="med" len="med"/>
+                    </a:lnB>
+                    <a:noFill/>
+                  </a:tcPr>
+                </a:tc>
+                <a:tc>
+                  <a:txBody>
+                    <a:bodyPr/>
+                    <a:lstStyle/>
+                    <a:p>
+                      <a:pPr algn="r" fontAlgn="b"/>
+                      <a:r>
+                        <a:rPr lang="en-SG" sz="1800" u="none" strike="noStrike">
+                          <a:effectLst/>
+                        </a:rPr>
+                        <a:t>1</a:t>
+                      </a:r>
+                      <a:endParaRPr lang="en-SG" sz="1800" b="0" i="0" u="none" strike="noStrike">
+                        <a:solidFill>
+                          <a:srgbClr val="000000"/>
+                        </a:solidFill>
+                        <a:effectLst/>
+                        <a:latin typeface="Calibri" panose="020F0502020204030204" pitchFamily="34" charset="0"/>
+                      </a:endParaRPr>
+                    </a:p>
+                  </a:txBody>
+                  <a:tcPr marL="11191" marR="11191" marT="11191" marB="0" anchor="b">
+                    <a:lnL w="12700" cap="flat" cmpd="sng" algn="ctr">
+                      <a:solidFill>
+                        <a:schemeClr val="tx1"/>
+                      </a:solidFill>
+                      <a:prstDash val="solid"/>
+                      <a:round/>
+                      <a:headEnd type="none" w="med" len="med"/>
+                      <a:tailEnd type="none" w="med" len="med"/>
+                    </a:lnL>
+                    <a:lnR w="12700" cap="flat" cmpd="sng" algn="ctr">
+                      <a:solidFill>
+                        <a:schemeClr val="tx1"/>
+                      </a:solidFill>
+                      <a:prstDash val="solid"/>
+                      <a:round/>
+                      <a:headEnd type="none" w="med" len="med"/>
+                      <a:tailEnd type="none" w="med" len="med"/>
+                    </a:lnR>
+                    <a:lnT w="12700" cap="flat" cmpd="sng" algn="ctr">
+                      <a:solidFill>
+                        <a:schemeClr val="tx1"/>
+                      </a:solidFill>
+                      <a:prstDash val="solid"/>
+                      <a:round/>
+                      <a:headEnd type="none" w="med" len="med"/>
+                      <a:tailEnd type="none" w="med" len="med"/>
+                    </a:lnT>
+                    <a:lnB w="12700" cap="flat" cmpd="sng" algn="ctr">
+                      <a:solidFill>
+                        <a:schemeClr val="tx1"/>
+                      </a:solidFill>
+                      <a:prstDash val="solid"/>
+                      <a:round/>
+                      <a:headEnd type="none" w="med" len="med"/>
+                      <a:tailEnd type="none" w="med" len="med"/>
+                    </a:lnB>
+                    <a:noFill/>
+                  </a:tcPr>
+                </a:tc>
+                <a:tc>
+                  <a:txBody>
+                    <a:bodyPr/>
+                    <a:lstStyle/>
+                    <a:p>
+                      <a:pPr algn="r" fontAlgn="b"/>
+                      <a:r>
+                        <a:rPr lang="en-SG" sz="1800" u="none" strike="noStrike" dirty="0">
+                          <a:effectLst/>
+                        </a:rPr>
+                        <a:t>200</a:t>
+                      </a:r>
+                      <a:endParaRPr lang="en-SG" sz="1800" b="0" i="0" u="none" strike="noStrike" dirty="0">
+                        <a:solidFill>
+                          <a:srgbClr val="000000"/>
+                        </a:solidFill>
+                        <a:effectLst/>
+                        <a:latin typeface="Calibri" panose="020F0502020204030204" pitchFamily="34" charset="0"/>
+                      </a:endParaRPr>
+                    </a:p>
+                  </a:txBody>
+                  <a:tcPr marL="11191" marR="11191" marT="11191" marB="0" anchor="b">
+                    <a:lnL w="12700" cap="flat" cmpd="sng" algn="ctr">
+                      <a:solidFill>
+                        <a:schemeClr val="tx1"/>
+                      </a:solidFill>
+                      <a:prstDash val="solid"/>
+                      <a:round/>
+                      <a:headEnd type="none" w="med" len="med"/>
+                      <a:tailEnd type="none" w="med" len="med"/>
+                    </a:lnL>
+                    <a:lnR w="12700" cap="flat" cmpd="sng" algn="ctr">
+                      <a:solidFill>
+                        <a:schemeClr val="tx1"/>
+                      </a:solidFill>
+                      <a:prstDash val="solid"/>
+                      <a:round/>
+                      <a:headEnd type="none" w="med" len="med"/>
+                      <a:tailEnd type="none" w="med" len="med"/>
+                    </a:lnR>
+                    <a:lnT w="12700" cap="flat" cmpd="sng" algn="ctr">
+                      <a:solidFill>
+                        <a:schemeClr val="tx1"/>
+                      </a:solidFill>
+                      <a:prstDash val="solid"/>
+                      <a:round/>
+                      <a:headEnd type="none" w="med" len="med"/>
+                      <a:tailEnd type="none" w="med" len="med"/>
+                    </a:lnT>
+                    <a:lnB w="12700" cap="flat" cmpd="sng" algn="ctr">
+                      <a:solidFill>
+                        <a:schemeClr val="tx1"/>
+                      </a:solidFill>
+                      <a:prstDash val="solid"/>
+                      <a:round/>
+                      <a:headEnd type="none" w="med" len="med"/>
+                      <a:tailEnd type="none" w="med" len="med"/>
+                    </a:lnB>
+                    <a:noFill/>
+                  </a:tcPr>
+                </a:tc>
+                <a:tc>
+                  <a:txBody>
+                    <a:bodyPr/>
+                    <a:lstStyle/>
+                    <a:p>
+                      <a:pPr algn="r" fontAlgn="b"/>
+                      <a:r>
+                        <a:rPr lang="en-SG" sz="1800" u="none" strike="noStrike">
+                          <a:effectLst/>
+                        </a:rPr>
+                        <a:t>20</a:t>
+                      </a:r>
+                      <a:endParaRPr lang="en-SG" sz="1800" b="0" i="0" u="none" strike="noStrike">
+                        <a:solidFill>
+                          <a:srgbClr val="000000"/>
+                        </a:solidFill>
+                        <a:effectLst/>
+                        <a:latin typeface="Calibri" panose="020F0502020204030204" pitchFamily="34" charset="0"/>
+                      </a:endParaRPr>
+                    </a:p>
+                  </a:txBody>
+                  <a:tcPr marL="11191" marR="11191" marT="11191" marB="0" anchor="b">
+                    <a:lnL w="12700" cap="flat" cmpd="sng" algn="ctr">
+                      <a:solidFill>
+                        <a:schemeClr val="tx1"/>
+                      </a:solidFill>
+                      <a:prstDash val="solid"/>
+                      <a:round/>
+                      <a:headEnd type="none" w="med" len="med"/>
+                      <a:tailEnd type="none" w="med" len="med"/>
+                    </a:lnL>
+                    <a:lnR w="12700" cap="flat" cmpd="sng" algn="ctr">
+                      <a:solidFill>
+                        <a:schemeClr val="tx1"/>
+                      </a:solidFill>
+                      <a:prstDash val="solid"/>
+                      <a:round/>
+                      <a:headEnd type="none" w="med" len="med"/>
+                      <a:tailEnd type="none" w="med" len="med"/>
+                    </a:lnR>
+                    <a:lnT w="12700" cap="flat" cmpd="sng" algn="ctr">
+                      <a:solidFill>
+                        <a:schemeClr val="tx1"/>
+                      </a:solidFill>
+                      <a:prstDash val="solid"/>
+                      <a:round/>
+                      <a:headEnd type="none" w="med" len="med"/>
+                      <a:tailEnd type="none" w="med" len="med"/>
+                    </a:lnT>
+                    <a:lnB w="12700" cap="flat" cmpd="sng" algn="ctr">
+                      <a:solidFill>
+                        <a:schemeClr val="tx1"/>
+                      </a:solidFill>
+                      <a:prstDash val="solid"/>
+                      <a:round/>
+                      <a:headEnd type="none" w="med" len="med"/>
+                      <a:tailEnd type="none" w="med" len="med"/>
+                    </a:lnB>
+                    <a:noFill/>
+                  </a:tcPr>
+                </a:tc>
+                <a:tc>
+                  <a:txBody>
+                    <a:bodyPr/>
+                    <a:lstStyle/>
+                    <a:p>
+                      <a:pPr algn="r" fontAlgn="b"/>
+                      <a:r>
+                        <a:rPr lang="en-SG" sz="1800" u="none" strike="noStrike">
+                          <a:effectLst/>
+                        </a:rPr>
+                        <a:t>4000</a:t>
+                      </a:r>
+                      <a:endParaRPr lang="en-SG" sz="1800" b="0" i="0" u="none" strike="noStrike">
+                        <a:solidFill>
+                          <a:srgbClr val="000000"/>
+                        </a:solidFill>
+                        <a:effectLst/>
+                        <a:latin typeface="Calibri" panose="020F0502020204030204" pitchFamily="34" charset="0"/>
+                      </a:endParaRPr>
+                    </a:p>
+                  </a:txBody>
+                  <a:tcPr marL="11191" marR="11191" marT="11191" marB="0" anchor="b">
+                    <a:lnL w="12700" cap="flat" cmpd="sng" algn="ctr">
+                      <a:solidFill>
+                        <a:schemeClr val="tx1"/>
+                      </a:solidFill>
+                      <a:prstDash val="solid"/>
+                      <a:round/>
+                      <a:headEnd type="none" w="med" len="med"/>
+                      <a:tailEnd type="none" w="med" len="med"/>
+                    </a:lnL>
+                    <a:lnR w="12700" cap="flat" cmpd="sng" algn="ctr">
+                      <a:solidFill>
+                        <a:schemeClr val="tx1"/>
+                      </a:solidFill>
+                      <a:prstDash val="solid"/>
+                      <a:round/>
+                      <a:headEnd type="none" w="med" len="med"/>
+                      <a:tailEnd type="none" w="med" len="med"/>
+                    </a:lnR>
+                    <a:lnT w="12700" cap="flat" cmpd="sng" algn="ctr">
+                      <a:solidFill>
+                        <a:schemeClr val="tx1"/>
+                      </a:solidFill>
+                      <a:prstDash val="solid"/>
+                      <a:round/>
+                      <a:headEnd type="none" w="med" len="med"/>
+                      <a:tailEnd type="none" w="med" len="med"/>
+                    </a:lnT>
+                    <a:lnB w="12700" cap="flat" cmpd="sng" algn="ctr">
+                      <a:solidFill>
+                        <a:schemeClr val="tx1"/>
+                      </a:solidFill>
+                      <a:prstDash val="solid"/>
+                      <a:round/>
+                      <a:headEnd type="none" w="med" len="med"/>
+                      <a:tailEnd type="none" w="med" len="med"/>
+                    </a:lnB>
+                    <a:noFill/>
+                  </a:tcPr>
+                </a:tc>
+                <a:extLst>
+                  <a:ext uri="{0D108BD9-81ED-4DB2-BD59-A6C34878D82A}">
+                    <a16:rowId xmlns:a16="http://schemas.microsoft.com/office/drawing/2014/main" val="3546926031"/>
+                  </a:ext>
+                </a:extLst>
+              </a:tr>
+              <a:tr h="290978">
+                <a:tc>
+                  <a:txBody>
+                    <a:bodyPr/>
+                    <a:lstStyle/>
+                    <a:p>
+                      <a:pPr algn="l" fontAlgn="b"/>
+                      <a:r>
+                        <a:rPr lang="en-SG" sz="1800" u="none" strike="noStrike">
+                          <a:effectLst/>
+                        </a:rPr>
+                        <a:t>Software Developer</a:t>
+                      </a:r>
+                      <a:endParaRPr lang="en-SG" sz="1800" b="0" i="0" u="none" strike="noStrike">
+                        <a:solidFill>
+                          <a:srgbClr val="000000"/>
+                        </a:solidFill>
+                        <a:effectLst/>
+                        <a:latin typeface="Calibri" panose="020F0502020204030204" pitchFamily="34" charset="0"/>
+                      </a:endParaRPr>
+                    </a:p>
+                  </a:txBody>
+                  <a:tcPr marL="11191" marR="11191" marT="11191" marB="0" anchor="b">
+                    <a:lnL w="12700" cap="flat" cmpd="sng" algn="ctr">
+                      <a:solidFill>
+                        <a:schemeClr val="tx1"/>
+                      </a:solidFill>
+                      <a:prstDash val="solid"/>
+                      <a:round/>
+                      <a:headEnd type="none" w="med" len="med"/>
+                      <a:tailEnd type="none" w="med" len="med"/>
+                    </a:lnL>
+                    <a:lnR w="12700" cap="flat" cmpd="sng" algn="ctr">
+                      <a:solidFill>
+                        <a:schemeClr val="tx1"/>
+                      </a:solidFill>
+                      <a:prstDash val="solid"/>
+                      <a:round/>
+                      <a:headEnd type="none" w="med" len="med"/>
+                      <a:tailEnd type="none" w="med" len="med"/>
+                    </a:lnR>
+                    <a:lnT w="12700" cap="flat" cmpd="sng" algn="ctr">
+                      <a:solidFill>
+                        <a:schemeClr val="tx1"/>
+                      </a:solidFill>
+                      <a:prstDash val="solid"/>
+                      <a:round/>
+                      <a:headEnd type="none" w="med" len="med"/>
+                      <a:tailEnd type="none" w="med" len="med"/>
+                    </a:lnT>
+                    <a:lnB w="12700" cap="flat" cmpd="sng" algn="ctr">
+                      <a:solidFill>
+                        <a:schemeClr val="tx1"/>
+                      </a:solidFill>
+                      <a:prstDash val="solid"/>
+                      <a:round/>
+                      <a:headEnd type="none" w="med" len="med"/>
+                      <a:tailEnd type="none" w="med" len="med"/>
+                    </a:lnB>
+                    <a:noFill/>
+                  </a:tcPr>
+                </a:tc>
+                <a:tc>
+                  <a:txBody>
+                    <a:bodyPr/>
+                    <a:lstStyle/>
+                    <a:p>
+                      <a:pPr algn="r" fontAlgn="b"/>
+                      <a:r>
+                        <a:rPr lang="en-SG" sz="1800" u="none" strike="noStrike">
+                          <a:effectLst/>
+                        </a:rPr>
+                        <a:t>2</a:t>
+                      </a:r>
+                      <a:endParaRPr lang="en-SG" sz="1800" b="0" i="0" u="none" strike="noStrike">
+                        <a:solidFill>
+                          <a:srgbClr val="000000"/>
+                        </a:solidFill>
+                        <a:effectLst/>
+                        <a:latin typeface="Calibri" panose="020F0502020204030204" pitchFamily="34" charset="0"/>
+                      </a:endParaRPr>
+                    </a:p>
+                  </a:txBody>
+                  <a:tcPr marL="11191" marR="11191" marT="11191" marB="0" anchor="b">
+                    <a:lnL w="12700" cap="flat" cmpd="sng" algn="ctr">
+                      <a:solidFill>
+                        <a:schemeClr val="tx1"/>
+                      </a:solidFill>
+                      <a:prstDash val="solid"/>
+                      <a:round/>
+                      <a:headEnd type="none" w="med" len="med"/>
+                      <a:tailEnd type="none" w="med" len="med"/>
+                    </a:lnL>
+                    <a:lnR w="12700" cap="flat" cmpd="sng" algn="ctr">
+                      <a:solidFill>
+                        <a:schemeClr val="tx1"/>
+                      </a:solidFill>
+                      <a:prstDash val="solid"/>
+                      <a:round/>
+                      <a:headEnd type="none" w="med" len="med"/>
+                      <a:tailEnd type="none" w="med" len="med"/>
+                    </a:lnR>
+                    <a:lnT w="12700" cap="flat" cmpd="sng" algn="ctr">
+                      <a:solidFill>
+                        <a:schemeClr val="tx1"/>
+                      </a:solidFill>
+                      <a:prstDash val="solid"/>
+                      <a:round/>
+                      <a:headEnd type="none" w="med" len="med"/>
+                      <a:tailEnd type="none" w="med" len="med"/>
+                    </a:lnT>
+                    <a:lnB w="12700" cap="flat" cmpd="sng" algn="ctr">
+                      <a:solidFill>
+                        <a:schemeClr val="tx1"/>
+                      </a:solidFill>
+                      <a:prstDash val="solid"/>
+                      <a:round/>
+                      <a:headEnd type="none" w="med" len="med"/>
+                      <a:tailEnd type="none" w="med" len="med"/>
+                    </a:lnB>
+                    <a:noFill/>
+                  </a:tcPr>
+                </a:tc>
+                <a:tc>
+                  <a:txBody>
+                    <a:bodyPr/>
+                    <a:lstStyle/>
+                    <a:p>
+                      <a:pPr algn="r" fontAlgn="b"/>
+                      <a:r>
+                        <a:rPr lang="en-SG" sz="1800" u="none" strike="noStrike" dirty="0">
+                          <a:effectLst/>
+                        </a:rPr>
+                        <a:t>250</a:t>
+                      </a:r>
+                      <a:endParaRPr lang="en-SG" sz="1800" b="0" i="0" u="none" strike="noStrike" dirty="0">
+                        <a:solidFill>
+                          <a:srgbClr val="000000"/>
+                        </a:solidFill>
+                        <a:effectLst/>
+                        <a:latin typeface="Calibri" panose="020F0502020204030204" pitchFamily="34" charset="0"/>
+                      </a:endParaRPr>
+                    </a:p>
+                  </a:txBody>
+                  <a:tcPr marL="11191" marR="11191" marT="11191" marB="0" anchor="b">
+                    <a:lnL w="12700" cap="flat" cmpd="sng" algn="ctr">
+                      <a:solidFill>
+                        <a:schemeClr val="tx1"/>
+                      </a:solidFill>
+                      <a:prstDash val="solid"/>
+                      <a:round/>
+                      <a:headEnd type="none" w="med" len="med"/>
+                      <a:tailEnd type="none" w="med" len="med"/>
+                    </a:lnL>
+                    <a:lnR w="12700" cap="flat" cmpd="sng" algn="ctr">
+                      <a:solidFill>
+                        <a:schemeClr val="tx1"/>
+                      </a:solidFill>
+                      <a:prstDash val="solid"/>
+                      <a:round/>
+                      <a:headEnd type="none" w="med" len="med"/>
+                      <a:tailEnd type="none" w="med" len="med"/>
+                    </a:lnR>
+                    <a:lnT w="12700" cap="flat" cmpd="sng" algn="ctr">
+                      <a:solidFill>
+                        <a:schemeClr val="tx1"/>
+                      </a:solidFill>
+                      <a:prstDash val="solid"/>
+                      <a:round/>
+                      <a:headEnd type="none" w="med" len="med"/>
+                      <a:tailEnd type="none" w="med" len="med"/>
+                    </a:lnT>
+                    <a:lnB w="12700" cap="flat" cmpd="sng" algn="ctr">
+                      <a:solidFill>
+                        <a:schemeClr val="tx1"/>
+                      </a:solidFill>
+                      <a:prstDash val="solid"/>
+                      <a:round/>
+                      <a:headEnd type="none" w="med" len="med"/>
+                      <a:tailEnd type="none" w="med" len="med"/>
+                    </a:lnB>
+                    <a:noFill/>
+                  </a:tcPr>
+                </a:tc>
+                <a:tc>
+                  <a:txBody>
+                    <a:bodyPr/>
+                    <a:lstStyle/>
+                    <a:p>
+                      <a:pPr algn="r" fontAlgn="b"/>
+                      <a:r>
+                        <a:rPr lang="en-SG" sz="1800" u="none" strike="noStrike">
+                          <a:effectLst/>
+                        </a:rPr>
+                        <a:t>90</a:t>
+                      </a:r>
+                      <a:endParaRPr lang="en-SG" sz="1800" b="0" i="0" u="none" strike="noStrike">
+                        <a:solidFill>
+                          <a:srgbClr val="000000"/>
+                        </a:solidFill>
+                        <a:effectLst/>
+                        <a:latin typeface="Calibri" panose="020F0502020204030204" pitchFamily="34" charset="0"/>
+                      </a:endParaRPr>
+                    </a:p>
+                  </a:txBody>
+                  <a:tcPr marL="11191" marR="11191" marT="11191" marB="0" anchor="b">
+                    <a:lnL w="12700" cap="flat" cmpd="sng" algn="ctr">
+                      <a:solidFill>
+                        <a:schemeClr val="tx1"/>
+                      </a:solidFill>
+                      <a:prstDash val="solid"/>
+                      <a:round/>
+                      <a:headEnd type="none" w="med" len="med"/>
+                      <a:tailEnd type="none" w="med" len="med"/>
+                    </a:lnL>
+                    <a:lnR w="12700" cap="flat" cmpd="sng" algn="ctr">
+                      <a:solidFill>
+                        <a:schemeClr val="tx1"/>
+                      </a:solidFill>
+                      <a:prstDash val="solid"/>
+                      <a:round/>
+                      <a:headEnd type="none" w="med" len="med"/>
+                      <a:tailEnd type="none" w="med" len="med"/>
+                    </a:lnR>
+                    <a:lnT w="12700" cap="flat" cmpd="sng" algn="ctr">
+                      <a:solidFill>
+                        <a:schemeClr val="tx1"/>
+                      </a:solidFill>
+                      <a:prstDash val="solid"/>
+                      <a:round/>
+                      <a:headEnd type="none" w="med" len="med"/>
+                      <a:tailEnd type="none" w="med" len="med"/>
+                    </a:lnT>
+                    <a:lnB w="12700" cap="flat" cmpd="sng" algn="ctr">
+                      <a:solidFill>
+                        <a:schemeClr val="tx1"/>
+                      </a:solidFill>
+                      <a:prstDash val="solid"/>
+                      <a:round/>
+                      <a:headEnd type="none" w="med" len="med"/>
+                      <a:tailEnd type="none" w="med" len="med"/>
+                    </a:lnB>
+                    <a:noFill/>
+                  </a:tcPr>
+                </a:tc>
+                <a:tc>
+                  <a:txBody>
+                    <a:bodyPr/>
+                    <a:lstStyle/>
+                    <a:p>
+                      <a:pPr algn="r" fontAlgn="b"/>
+                      <a:r>
+                        <a:rPr lang="en-SG" sz="1800" u="none" strike="noStrike">
+                          <a:effectLst/>
+                        </a:rPr>
+                        <a:t>45000</a:t>
+                      </a:r>
+                      <a:endParaRPr lang="en-SG" sz="1800" b="0" i="0" u="none" strike="noStrike">
+                        <a:solidFill>
+                          <a:srgbClr val="000000"/>
+                        </a:solidFill>
+                        <a:effectLst/>
+                        <a:latin typeface="Calibri" panose="020F0502020204030204" pitchFamily="34" charset="0"/>
+                      </a:endParaRPr>
+                    </a:p>
+                  </a:txBody>
+                  <a:tcPr marL="11191" marR="11191" marT="11191" marB="0" anchor="b">
+                    <a:lnL w="12700" cap="flat" cmpd="sng" algn="ctr">
+                      <a:solidFill>
+                        <a:schemeClr val="tx1"/>
+                      </a:solidFill>
+                      <a:prstDash val="solid"/>
+                      <a:round/>
+                      <a:headEnd type="none" w="med" len="med"/>
+                      <a:tailEnd type="none" w="med" len="med"/>
+                    </a:lnL>
+                    <a:lnR w="12700" cap="flat" cmpd="sng" algn="ctr">
+                      <a:solidFill>
+                        <a:schemeClr val="tx1"/>
+                      </a:solidFill>
+                      <a:prstDash val="solid"/>
+                      <a:round/>
+                      <a:headEnd type="none" w="med" len="med"/>
+                      <a:tailEnd type="none" w="med" len="med"/>
+                    </a:lnR>
+                    <a:lnT w="12700" cap="flat" cmpd="sng" algn="ctr">
+                      <a:solidFill>
+                        <a:schemeClr val="tx1"/>
+                      </a:solidFill>
+                      <a:prstDash val="solid"/>
+                      <a:round/>
+                      <a:headEnd type="none" w="med" len="med"/>
+                      <a:tailEnd type="none" w="med" len="med"/>
+                    </a:lnT>
+                    <a:lnB w="12700" cap="flat" cmpd="sng" algn="ctr">
+                      <a:solidFill>
+                        <a:schemeClr val="tx1"/>
+                      </a:solidFill>
+                      <a:prstDash val="solid"/>
+                      <a:round/>
+                      <a:headEnd type="none" w="med" len="med"/>
+                      <a:tailEnd type="none" w="med" len="med"/>
+                    </a:lnB>
+                    <a:noFill/>
+                  </a:tcPr>
+                </a:tc>
+                <a:extLst>
+                  <a:ext uri="{0D108BD9-81ED-4DB2-BD59-A6C34878D82A}">
+                    <a16:rowId xmlns:a16="http://schemas.microsoft.com/office/drawing/2014/main" val="2378145640"/>
+                  </a:ext>
+                </a:extLst>
+              </a:tr>
+              <a:tr h="290978">
+                <a:tc>
+                  <a:txBody>
+                    <a:bodyPr/>
+                    <a:lstStyle/>
+                    <a:p>
+                      <a:pPr algn="l" fontAlgn="b"/>
+                      <a:r>
+                        <a:rPr lang="en-SG" sz="1800" u="none" strike="noStrike">
+                          <a:effectLst/>
+                        </a:rPr>
+                        <a:t>UI/UX Designer</a:t>
+                      </a:r>
+                      <a:endParaRPr lang="en-SG" sz="1800" b="0" i="0" u="none" strike="noStrike">
+                        <a:solidFill>
+                          <a:srgbClr val="000000"/>
+                        </a:solidFill>
+                        <a:effectLst/>
+                        <a:latin typeface="Calibri" panose="020F0502020204030204" pitchFamily="34" charset="0"/>
+                      </a:endParaRPr>
+                    </a:p>
+                  </a:txBody>
+                  <a:tcPr marL="11191" marR="11191" marT="11191" marB="0" anchor="b">
+                    <a:lnL w="12700" cap="flat" cmpd="sng" algn="ctr">
+                      <a:solidFill>
+                        <a:schemeClr val="tx1"/>
+                      </a:solidFill>
+                      <a:prstDash val="solid"/>
+                      <a:round/>
+                      <a:headEnd type="none" w="med" len="med"/>
+                      <a:tailEnd type="none" w="med" len="med"/>
+                    </a:lnL>
+                    <a:lnR w="12700" cap="flat" cmpd="sng" algn="ctr">
+                      <a:solidFill>
+                        <a:schemeClr val="tx1"/>
+                      </a:solidFill>
+                      <a:prstDash val="solid"/>
+                      <a:round/>
+                      <a:headEnd type="none" w="med" len="med"/>
+                      <a:tailEnd type="none" w="med" len="med"/>
+                    </a:lnR>
+                    <a:lnT w="12700" cap="flat" cmpd="sng" algn="ctr">
+                      <a:solidFill>
+                        <a:schemeClr val="tx1"/>
+                      </a:solidFill>
+                      <a:prstDash val="solid"/>
+                      <a:round/>
+                      <a:headEnd type="none" w="med" len="med"/>
+                      <a:tailEnd type="none" w="med" len="med"/>
+                    </a:lnT>
+                    <a:lnB w="12700" cap="flat" cmpd="sng" algn="ctr">
+                      <a:solidFill>
+                        <a:schemeClr val="tx1"/>
+                      </a:solidFill>
+                      <a:prstDash val="solid"/>
+                      <a:round/>
+                      <a:headEnd type="none" w="med" len="med"/>
+                      <a:tailEnd type="none" w="med" len="med"/>
+                    </a:lnB>
+                    <a:noFill/>
+                  </a:tcPr>
+                </a:tc>
+                <a:tc>
+                  <a:txBody>
+                    <a:bodyPr/>
+                    <a:lstStyle/>
+                    <a:p>
+                      <a:pPr algn="r" fontAlgn="b"/>
+                      <a:r>
+                        <a:rPr lang="en-SG" sz="1800" u="none" strike="noStrike">
+                          <a:effectLst/>
+                        </a:rPr>
+                        <a:t>1</a:t>
+                      </a:r>
+                      <a:endParaRPr lang="en-SG" sz="1800" b="0" i="0" u="none" strike="noStrike">
+                        <a:solidFill>
+                          <a:srgbClr val="000000"/>
+                        </a:solidFill>
+                        <a:effectLst/>
+                        <a:latin typeface="Calibri" panose="020F0502020204030204" pitchFamily="34" charset="0"/>
+                      </a:endParaRPr>
+                    </a:p>
+                  </a:txBody>
+                  <a:tcPr marL="11191" marR="11191" marT="11191" marB="0" anchor="b">
+                    <a:lnL w="12700" cap="flat" cmpd="sng" algn="ctr">
+                      <a:solidFill>
+                        <a:schemeClr val="tx1"/>
+                      </a:solidFill>
+                      <a:prstDash val="solid"/>
+                      <a:round/>
+                      <a:headEnd type="none" w="med" len="med"/>
+                      <a:tailEnd type="none" w="med" len="med"/>
+                    </a:lnL>
+                    <a:lnR w="12700" cap="flat" cmpd="sng" algn="ctr">
+                      <a:solidFill>
+                        <a:schemeClr val="tx1"/>
+                      </a:solidFill>
+                      <a:prstDash val="solid"/>
+                      <a:round/>
+                      <a:headEnd type="none" w="med" len="med"/>
+                      <a:tailEnd type="none" w="med" len="med"/>
+                    </a:lnR>
+                    <a:lnT w="12700" cap="flat" cmpd="sng" algn="ctr">
+                      <a:solidFill>
+                        <a:schemeClr val="tx1"/>
+                      </a:solidFill>
+                      <a:prstDash val="solid"/>
+                      <a:round/>
+                      <a:headEnd type="none" w="med" len="med"/>
+                      <a:tailEnd type="none" w="med" len="med"/>
+                    </a:lnT>
+                    <a:lnB w="12700" cap="flat" cmpd="sng" algn="ctr">
+                      <a:solidFill>
+                        <a:schemeClr val="tx1"/>
+                      </a:solidFill>
+                      <a:prstDash val="solid"/>
+                      <a:round/>
+                      <a:headEnd type="none" w="med" len="med"/>
+                      <a:tailEnd type="none" w="med" len="med"/>
+                    </a:lnB>
+                    <a:noFill/>
+                  </a:tcPr>
+                </a:tc>
+                <a:tc>
+                  <a:txBody>
+                    <a:bodyPr/>
+                    <a:lstStyle/>
+                    <a:p>
+                      <a:pPr algn="r" fontAlgn="b"/>
+                      <a:r>
+                        <a:rPr lang="en-SG" sz="1800" u="none" strike="noStrike">
+                          <a:effectLst/>
+                        </a:rPr>
+                        <a:t>200</a:t>
+                      </a:r>
+                      <a:endParaRPr lang="en-SG" sz="1800" b="0" i="0" u="none" strike="noStrike">
+                        <a:solidFill>
+                          <a:srgbClr val="000000"/>
+                        </a:solidFill>
+                        <a:effectLst/>
+                        <a:latin typeface="Calibri" panose="020F0502020204030204" pitchFamily="34" charset="0"/>
+                      </a:endParaRPr>
+                    </a:p>
+                  </a:txBody>
+                  <a:tcPr marL="11191" marR="11191" marT="11191" marB="0" anchor="b">
+                    <a:lnL w="12700" cap="flat" cmpd="sng" algn="ctr">
+                      <a:solidFill>
+                        <a:schemeClr val="tx1"/>
+                      </a:solidFill>
+                      <a:prstDash val="solid"/>
+                      <a:round/>
+                      <a:headEnd type="none" w="med" len="med"/>
+                      <a:tailEnd type="none" w="med" len="med"/>
+                    </a:lnL>
+                    <a:lnR w="12700" cap="flat" cmpd="sng" algn="ctr">
+                      <a:solidFill>
+                        <a:schemeClr val="tx1"/>
+                      </a:solidFill>
+                      <a:prstDash val="solid"/>
+                      <a:round/>
+                      <a:headEnd type="none" w="med" len="med"/>
+                      <a:tailEnd type="none" w="med" len="med"/>
+                    </a:lnR>
+                    <a:lnT w="12700" cap="flat" cmpd="sng" algn="ctr">
+                      <a:solidFill>
+                        <a:schemeClr val="tx1"/>
+                      </a:solidFill>
+                      <a:prstDash val="solid"/>
+                      <a:round/>
+                      <a:headEnd type="none" w="med" len="med"/>
+                      <a:tailEnd type="none" w="med" len="med"/>
+                    </a:lnT>
+                    <a:lnB w="12700" cap="flat" cmpd="sng" algn="ctr">
+                      <a:solidFill>
+                        <a:schemeClr val="tx1"/>
+                      </a:solidFill>
+                      <a:prstDash val="solid"/>
+                      <a:round/>
+                      <a:headEnd type="none" w="med" len="med"/>
+                      <a:tailEnd type="none" w="med" len="med"/>
+                    </a:lnB>
+                    <a:noFill/>
+                  </a:tcPr>
+                </a:tc>
+                <a:tc>
+                  <a:txBody>
+                    <a:bodyPr/>
+                    <a:lstStyle/>
+                    <a:p>
+                      <a:pPr algn="r" fontAlgn="b"/>
+                      <a:r>
+                        <a:rPr lang="en-SG" sz="1800" u="none" strike="noStrike">
+                          <a:effectLst/>
+                        </a:rPr>
+                        <a:t>60</a:t>
+                      </a:r>
+                      <a:endParaRPr lang="en-SG" sz="1800" b="0" i="0" u="none" strike="noStrike">
+                        <a:solidFill>
+                          <a:srgbClr val="000000"/>
+                        </a:solidFill>
+                        <a:effectLst/>
+                        <a:latin typeface="Calibri" panose="020F0502020204030204" pitchFamily="34" charset="0"/>
+                      </a:endParaRPr>
+                    </a:p>
+                  </a:txBody>
+                  <a:tcPr marL="11191" marR="11191" marT="11191" marB="0" anchor="b">
+                    <a:lnL w="12700" cap="flat" cmpd="sng" algn="ctr">
+                      <a:solidFill>
+                        <a:schemeClr val="tx1"/>
+                      </a:solidFill>
+                      <a:prstDash val="solid"/>
+                      <a:round/>
+                      <a:headEnd type="none" w="med" len="med"/>
+                      <a:tailEnd type="none" w="med" len="med"/>
+                    </a:lnL>
+                    <a:lnR w="12700" cap="flat" cmpd="sng" algn="ctr">
+                      <a:solidFill>
+                        <a:schemeClr val="tx1"/>
+                      </a:solidFill>
+                      <a:prstDash val="solid"/>
+                      <a:round/>
+                      <a:headEnd type="none" w="med" len="med"/>
+                      <a:tailEnd type="none" w="med" len="med"/>
+                    </a:lnR>
+                    <a:lnT w="12700" cap="flat" cmpd="sng" algn="ctr">
+                      <a:solidFill>
+                        <a:schemeClr val="tx1"/>
+                      </a:solidFill>
+                      <a:prstDash val="solid"/>
+                      <a:round/>
+                      <a:headEnd type="none" w="med" len="med"/>
+                      <a:tailEnd type="none" w="med" len="med"/>
+                    </a:lnT>
+                    <a:lnB w="12700" cap="flat" cmpd="sng" algn="ctr">
+                      <a:solidFill>
+                        <a:schemeClr val="tx1"/>
+                      </a:solidFill>
+                      <a:prstDash val="solid"/>
+                      <a:round/>
+                      <a:headEnd type="none" w="med" len="med"/>
+                      <a:tailEnd type="none" w="med" len="med"/>
+                    </a:lnB>
+                    <a:noFill/>
+                  </a:tcPr>
+                </a:tc>
+                <a:tc>
+                  <a:txBody>
+                    <a:bodyPr/>
+                    <a:lstStyle/>
+                    <a:p>
+                      <a:pPr algn="r" fontAlgn="b"/>
+                      <a:r>
+                        <a:rPr lang="en-SG" sz="1800" u="none" strike="noStrike">
+                          <a:effectLst/>
+                        </a:rPr>
+                        <a:t>12000</a:t>
+                      </a:r>
+                      <a:endParaRPr lang="en-SG" sz="1800" b="0" i="0" u="none" strike="noStrike">
+                        <a:solidFill>
+                          <a:srgbClr val="000000"/>
+                        </a:solidFill>
+                        <a:effectLst/>
+                        <a:latin typeface="Calibri" panose="020F0502020204030204" pitchFamily="34" charset="0"/>
+                      </a:endParaRPr>
+                    </a:p>
+                  </a:txBody>
+                  <a:tcPr marL="11191" marR="11191" marT="11191" marB="0" anchor="b">
+                    <a:lnL w="12700" cap="flat" cmpd="sng" algn="ctr">
+                      <a:solidFill>
+                        <a:schemeClr val="tx1"/>
+                      </a:solidFill>
+                      <a:prstDash val="solid"/>
+                      <a:round/>
+                      <a:headEnd type="none" w="med" len="med"/>
+                      <a:tailEnd type="none" w="med" len="med"/>
+                    </a:lnL>
+                    <a:lnR w="12700" cap="flat" cmpd="sng" algn="ctr">
+                      <a:solidFill>
+                        <a:schemeClr val="tx1"/>
+                      </a:solidFill>
+                      <a:prstDash val="solid"/>
+                      <a:round/>
+                      <a:headEnd type="none" w="med" len="med"/>
+                      <a:tailEnd type="none" w="med" len="med"/>
+                    </a:lnR>
+                    <a:lnT w="12700" cap="flat" cmpd="sng" algn="ctr">
+                      <a:solidFill>
+                        <a:schemeClr val="tx1"/>
+                      </a:solidFill>
+                      <a:prstDash val="solid"/>
+                      <a:round/>
+                      <a:headEnd type="none" w="med" len="med"/>
+                      <a:tailEnd type="none" w="med" len="med"/>
+                    </a:lnT>
+                    <a:lnB w="12700" cap="flat" cmpd="sng" algn="ctr">
+                      <a:solidFill>
+                        <a:schemeClr val="tx1"/>
+                      </a:solidFill>
+                      <a:prstDash val="solid"/>
+                      <a:round/>
+                      <a:headEnd type="none" w="med" len="med"/>
+                      <a:tailEnd type="none" w="med" len="med"/>
+                    </a:lnB>
+                    <a:noFill/>
+                  </a:tcPr>
+                </a:tc>
+                <a:extLst>
+                  <a:ext uri="{0D108BD9-81ED-4DB2-BD59-A6C34878D82A}">
+                    <a16:rowId xmlns:a16="http://schemas.microsoft.com/office/drawing/2014/main" val="2101999186"/>
+                  </a:ext>
+                </a:extLst>
+              </a:tr>
+              <a:tr h="290978">
+                <a:tc>
+                  <a:txBody>
+                    <a:bodyPr/>
+                    <a:lstStyle/>
+                    <a:p>
+                      <a:pPr algn="l" fontAlgn="b"/>
+                      <a:r>
+                        <a:rPr lang="en-SG" sz="1800" u="none" strike="noStrike">
+                          <a:effectLst/>
+                        </a:rPr>
+                        <a:t>Field Surveyor</a:t>
+                      </a:r>
+                      <a:endParaRPr lang="en-SG" sz="1800" b="0" i="0" u="none" strike="noStrike">
+                        <a:solidFill>
+                          <a:srgbClr val="000000"/>
+                        </a:solidFill>
+                        <a:effectLst/>
+                        <a:latin typeface="Calibri" panose="020F0502020204030204" pitchFamily="34" charset="0"/>
+                      </a:endParaRPr>
+                    </a:p>
+                  </a:txBody>
+                  <a:tcPr marL="11191" marR="11191" marT="11191" marB="0" anchor="b">
+                    <a:lnL w="12700" cap="flat" cmpd="sng" algn="ctr">
+                      <a:solidFill>
+                        <a:schemeClr val="tx1"/>
+                      </a:solidFill>
+                      <a:prstDash val="solid"/>
+                      <a:round/>
+                      <a:headEnd type="none" w="med" len="med"/>
+                      <a:tailEnd type="none" w="med" len="med"/>
+                    </a:lnL>
+                    <a:lnR w="12700" cap="flat" cmpd="sng" algn="ctr">
+                      <a:solidFill>
+                        <a:schemeClr val="tx1"/>
+                      </a:solidFill>
+                      <a:prstDash val="solid"/>
+                      <a:round/>
+                      <a:headEnd type="none" w="med" len="med"/>
+                      <a:tailEnd type="none" w="med" len="med"/>
+                    </a:lnR>
+                    <a:lnT w="12700" cap="flat" cmpd="sng" algn="ctr">
+                      <a:solidFill>
+                        <a:schemeClr val="tx1"/>
+                      </a:solidFill>
+                      <a:prstDash val="solid"/>
+                      <a:round/>
+                      <a:headEnd type="none" w="med" len="med"/>
+                      <a:tailEnd type="none" w="med" len="med"/>
+                    </a:lnT>
+                    <a:lnB w="12700" cap="flat" cmpd="sng" algn="ctr">
+                      <a:solidFill>
+                        <a:schemeClr val="tx1"/>
+                      </a:solidFill>
+                      <a:prstDash val="solid"/>
+                      <a:round/>
+                      <a:headEnd type="none" w="med" len="med"/>
+                      <a:tailEnd type="none" w="med" len="med"/>
+                    </a:lnB>
+                    <a:noFill/>
+                  </a:tcPr>
+                </a:tc>
+                <a:tc>
+                  <a:txBody>
+                    <a:bodyPr/>
+                    <a:lstStyle/>
+                    <a:p>
+                      <a:pPr algn="r" fontAlgn="b"/>
+                      <a:r>
+                        <a:rPr lang="en-SG" sz="1800" u="none" strike="noStrike">
+                          <a:effectLst/>
+                        </a:rPr>
+                        <a:t>2</a:t>
+                      </a:r>
+                      <a:endParaRPr lang="en-SG" sz="1800" b="0" i="0" u="none" strike="noStrike">
+                        <a:solidFill>
+                          <a:srgbClr val="000000"/>
+                        </a:solidFill>
+                        <a:effectLst/>
+                        <a:latin typeface="Calibri" panose="020F0502020204030204" pitchFamily="34" charset="0"/>
+                      </a:endParaRPr>
+                    </a:p>
+                  </a:txBody>
+                  <a:tcPr marL="11191" marR="11191" marT="11191" marB="0" anchor="b">
+                    <a:lnL w="12700" cap="flat" cmpd="sng" algn="ctr">
+                      <a:solidFill>
+                        <a:schemeClr val="tx1"/>
+                      </a:solidFill>
+                      <a:prstDash val="solid"/>
+                      <a:round/>
+                      <a:headEnd type="none" w="med" len="med"/>
+                      <a:tailEnd type="none" w="med" len="med"/>
+                    </a:lnL>
+                    <a:lnR w="12700" cap="flat" cmpd="sng" algn="ctr">
+                      <a:solidFill>
+                        <a:schemeClr val="tx1"/>
+                      </a:solidFill>
+                      <a:prstDash val="solid"/>
+                      <a:round/>
+                      <a:headEnd type="none" w="med" len="med"/>
+                      <a:tailEnd type="none" w="med" len="med"/>
+                    </a:lnR>
+                    <a:lnT w="12700" cap="flat" cmpd="sng" algn="ctr">
+                      <a:solidFill>
+                        <a:schemeClr val="tx1"/>
+                      </a:solidFill>
+                      <a:prstDash val="solid"/>
+                      <a:round/>
+                      <a:headEnd type="none" w="med" len="med"/>
+                      <a:tailEnd type="none" w="med" len="med"/>
+                    </a:lnT>
+                    <a:lnB w="12700" cap="flat" cmpd="sng" algn="ctr">
+                      <a:solidFill>
+                        <a:schemeClr val="tx1"/>
+                      </a:solidFill>
+                      <a:prstDash val="solid"/>
+                      <a:round/>
+                      <a:headEnd type="none" w="med" len="med"/>
+                      <a:tailEnd type="none" w="med" len="med"/>
+                    </a:lnB>
+                    <a:noFill/>
+                  </a:tcPr>
+                </a:tc>
+                <a:tc>
+                  <a:txBody>
+                    <a:bodyPr/>
+                    <a:lstStyle/>
+                    <a:p>
+                      <a:pPr algn="r" fontAlgn="b"/>
+                      <a:r>
+                        <a:rPr lang="en-SG" sz="1800" u="none" strike="noStrike" dirty="0">
+                          <a:effectLst/>
+                        </a:rPr>
+                        <a:t>150</a:t>
+                      </a:r>
+                      <a:endParaRPr lang="en-SG" sz="1800" b="0" i="0" u="none" strike="noStrike" dirty="0">
+                        <a:solidFill>
+                          <a:srgbClr val="000000"/>
+                        </a:solidFill>
+                        <a:effectLst/>
+                        <a:latin typeface="Calibri" panose="020F0502020204030204" pitchFamily="34" charset="0"/>
+                      </a:endParaRPr>
+                    </a:p>
+                  </a:txBody>
+                  <a:tcPr marL="11191" marR="11191" marT="11191" marB="0" anchor="b">
+                    <a:lnL w="12700" cap="flat" cmpd="sng" algn="ctr">
+                      <a:solidFill>
+                        <a:schemeClr val="tx1"/>
+                      </a:solidFill>
+                      <a:prstDash val="solid"/>
+                      <a:round/>
+                      <a:headEnd type="none" w="med" len="med"/>
+                      <a:tailEnd type="none" w="med" len="med"/>
+                    </a:lnL>
+                    <a:lnR w="12700" cap="flat" cmpd="sng" algn="ctr">
+                      <a:solidFill>
+                        <a:schemeClr val="tx1"/>
+                      </a:solidFill>
+                      <a:prstDash val="solid"/>
+                      <a:round/>
+                      <a:headEnd type="none" w="med" len="med"/>
+                      <a:tailEnd type="none" w="med" len="med"/>
+                    </a:lnR>
+                    <a:lnT w="12700" cap="flat" cmpd="sng" algn="ctr">
+                      <a:solidFill>
+                        <a:schemeClr val="tx1"/>
+                      </a:solidFill>
+                      <a:prstDash val="solid"/>
+                      <a:round/>
+                      <a:headEnd type="none" w="med" len="med"/>
+                      <a:tailEnd type="none" w="med" len="med"/>
+                    </a:lnT>
+                    <a:lnB w="12700" cap="flat" cmpd="sng" algn="ctr">
+                      <a:solidFill>
+                        <a:schemeClr val="tx1"/>
+                      </a:solidFill>
+                      <a:prstDash val="solid"/>
+                      <a:round/>
+                      <a:headEnd type="none" w="med" len="med"/>
+                      <a:tailEnd type="none" w="med" len="med"/>
+                    </a:lnB>
+                    <a:noFill/>
+                  </a:tcPr>
+                </a:tc>
+                <a:tc>
+                  <a:txBody>
+                    <a:bodyPr/>
+                    <a:lstStyle/>
+                    <a:p>
+                      <a:pPr algn="r" fontAlgn="b"/>
+                      <a:r>
+                        <a:rPr lang="en-SG" sz="1800" u="none" strike="noStrike">
+                          <a:effectLst/>
+                        </a:rPr>
+                        <a:t>30</a:t>
+                      </a:r>
+                      <a:endParaRPr lang="en-SG" sz="1800" b="0" i="0" u="none" strike="noStrike">
+                        <a:solidFill>
+                          <a:srgbClr val="000000"/>
+                        </a:solidFill>
+                        <a:effectLst/>
+                        <a:latin typeface="Calibri" panose="020F0502020204030204" pitchFamily="34" charset="0"/>
+                      </a:endParaRPr>
+                    </a:p>
+                  </a:txBody>
+                  <a:tcPr marL="11191" marR="11191" marT="11191" marB="0" anchor="b">
+                    <a:lnL w="12700" cap="flat" cmpd="sng" algn="ctr">
+                      <a:solidFill>
+                        <a:schemeClr val="tx1"/>
+                      </a:solidFill>
+                      <a:prstDash val="solid"/>
+                      <a:round/>
+                      <a:headEnd type="none" w="med" len="med"/>
+                      <a:tailEnd type="none" w="med" len="med"/>
+                    </a:lnL>
+                    <a:lnR w="12700" cap="flat" cmpd="sng" algn="ctr">
+                      <a:solidFill>
+                        <a:schemeClr val="tx1"/>
+                      </a:solidFill>
+                      <a:prstDash val="solid"/>
+                      <a:round/>
+                      <a:headEnd type="none" w="med" len="med"/>
+                      <a:tailEnd type="none" w="med" len="med"/>
+                    </a:lnR>
+                    <a:lnT w="12700" cap="flat" cmpd="sng" algn="ctr">
+                      <a:solidFill>
+                        <a:schemeClr val="tx1"/>
+                      </a:solidFill>
+                      <a:prstDash val="solid"/>
+                      <a:round/>
+                      <a:headEnd type="none" w="med" len="med"/>
+                      <a:tailEnd type="none" w="med" len="med"/>
+                    </a:lnT>
+                    <a:lnB w="12700" cap="flat" cmpd="sng" algn="ctr">
+                      <a:solidFill>
+                        <a:schemeClr val="tx1"/>
+                      </a:solidFill>
+                      <a:prstDash val="solid"/>
+                      <a:round/>
+                      <a:headEnd type="none" w="med" len="med"/>
+                      <a:tailEnd type="none" w="med" len="med"/>
+                    </a:lnB>
+                    <a:noFill/>
+                  </a:tcPr>
+                </a:tc>
+                <a:tc>
+                  <a:txBody>
+                    <a:bodyPr/>
+                    <a:lstStyle/>
+                    <a:p>
+                      <a:pPr algn="r" fontAlgn="b"/>
+                      <a:r>
+                        <a:rPr lang="en-SG" sz="1800" u="none" strike="noStrike">
+                          <a:effectLst/>
+                        </a:rPr>
+                        <a:t>9000</a:t>
+                      </a:r>
+                      <a:endParaRPr lang="en-SG" sz="1800" b="0" i="0" u="none" strike="noStrike">
+                        <a:solidFill>
+                          <a:srgbClr val="000000"/>
+                        </a:solidFill>
+                        <a:effectLst/>
+                        <a:latin typeface="Calibri" panose="020F0502020204030204" pitchFamily="34" charset="0"/>
+                      </a:endParaRPr>
+                    </a:p>
+                  </a:txBody>
+                  <a:tcPr marL="11191" marR="11191" marT="11191" marB="0" anchor="b">
+                    <a:lnL w="12700" cap="flat" cmpd="sng" algn="ctr">
+                      <a:solidFill>
+                        <a:schemeClr val="tx1"/>
+                      </a:solidFill>
+                      <a:prstDash val="solid"/>
+                      <a:round/>
+                      <a:headEnd type="none" w="med" len="med"/>
+                      <a:tailEnd type="none" w="med" len="med"/>
+                    </a:lnL>
+                    <a:lnR w="12700" cap="flat" cmpd="sng" algn="ctr">
+                      <a:solidFill>
+                        <a:schemeClr val="tx1"/>
+                      </a:solidFill>
+                      <a:prstDash val="solid"/>
+                      <a:round/>
+                      <a:headEnd type="none" w="med" len="med"/>
+                      <a:tailEnd type="none" w="med" len="med"/>
+                    </a:lnR>
+                    <a:lnT w="12700" cap="flat" cmpd="sng" algn="ctr">
+                      <a:solidFill>
+                        <a:schemeClr val="tx1"/>
+                      </a:solidFill>
+                      <a:prstDash val="solid"/>
+                      <a:round/>
+                      <a:headEnd type="none" w="med" len="med"/>
+                      <a:tailEnd type="none" w="med" len="med"/>
+                    </a:lnT>
+                    <a:lnB w="12700" cap="flat" cmpd="sng" algn="ctr">
+                      <a:solidFill>
+                        <a:schemeClr val="tx1"/>
+                      </a:solidFill>
+                      <a:prstDash val="solid"/>
+                      <a:round/>
+                      <a:headEnd type="none" w="med" len="med"/>
+                      <a:tailEnd type="none" w="med" len="med"/>
+                    </a:lnB>
+                    <a:noFill/>
+                  </a:tcPr>
+                </a:tc>
+                <a:extLst>
+                  <a:ext uri="{0D108BD9-81ED-4DB2-BD59-A6C34878D82A}">
+                    <a16:rowId xmlns:a16="http://schemas.microsoft.com/office/drawing/2014/main" val="3005812365"/>
+                  </a:ext>
+                </a:extLst>
+              </a:tr>
+              <a:tr h="290978">
+                <a:tc>
+                  <a:txBody>
+                    <a:bodyPr/>
+                    <a:lstStyle/>
+                    <a:p>
+                      <a:pPr algn="l" fontAlgn="b"/>
+                      <a:r>
+                        <a:rPr lang="en-SG" sz="1800" u="none" strike="noStrike" dirty="0">
+                          <a:effectLst/>
+                        </a:rPr>
+                        <a:t>Government and Public Affairs</a:t>
+                      </a:r>
+                      <a:endParaRPr lang="en-SG" sz="1800" b="0" i="0" u="none" strike="noStrike" dirty="0">
+                        <a:solidFill>
+                          <a:srgbClr val="000000"/>
+                        </a:solidFill>
+                        <a:effectLst/>
+                        <a:latin typeface="Calibri" panose="020F0502020204030204" pitchFamily="34" charset="0"/>
+                      </a:endParaRPr>
+                    </a:p>
+                  </a:txBody>
+                  <a:tcPr marL="11191" marR="11191" marT="11191" marB="0" anchor="b">
+                    <a:lnL w="12700" cap="flat" cmpd="sng" algn="ctr">
+                      <a:solidFill>
+                        <a:schemeClr val="tx1"/>
+                      </a:solidFill>
+                      <a:prstDash val="solid"/>
+                      <a:round/>
+                      <a:headEnd type="none" w="med" len="med"/>
+                      <a:tailEnd type="none" w="med" len="med"/>
+                    </a:lnL>
+                    <a:lnR w="12700" cap="flat" cmpd="sng" algn="ctr">
+                      <a:solidFill>
+                        <a:schemeClr val="tx1"/>
+                      </a:solidFill>
+                      <a:prstDash val="solid"/>
+                      <a:round/>
+                      <a:headEnd type="none" w="med" len="med"/>
+                      <a:tailEnd type="none" w="med" len="med"/>
+                    </a:lnR>
+                    <a:lnT w="12700" cap="flat" cmpd="sng" algn="ctr">
+                      <a:solidFill>
+                        <a:schemeClr val="tx1"/>
+                      </a:solidFill>
+                      <a:prstDash val="solid"/>
+                      <a:round/>
+                      <a:headEnd type="none" w="med" len="med"/>
+                      <a:tailEnd type="none" w="med" len="med"/>
+                    </a:lnT>
+                    <a:lnB w="38100" cap="flat" cmpd="sng" algn="ctr">
+                      <a:solidFill>
+                        <a:schemeClr val="tx1"/>
+                      </a:solidFill>
+                      <a:prstDash val="solid"/>
+                      <a:round/>
+                      <a:headEnd type="none" w="med" len="med"/>
+                      <a:tailEnd type="none" w="med" len="med"/>
+                    </a:lnB>
+                    <a:noFill/>
+                  </a:tcPr>
+                </a:tc>
+                <a:tc>
+                  <a:txBody>
+                    <a:bodyPr/>
+                    <a:lstStyle/>
+                    <a:p>
+                      <a:pPr algn="r" fontAlgn="b"/>
+                      <a:r>
+                        <a:rPr lang="en-SG" sz="1800" u="none" strike="noStrike" dirty="0">
+                          <a:effectLst/>
+                        </a:rPr>
+                        <a:t>1</a:t>
+                      </a:r>
+                      <a:endParaRPr lang="en-SG" sz="1800" b="0" i="0" u="none" strike="noStrike" dirty="0">
+                        <a:solidFill>
+                          <a:srgbClr val="000000"/>
+                        </a:solidFill>
+                        <a:effectLst/>
+                        <a:latin typeface="Calibri" panose="020F0502020204030204" pitchFamily="34" charset="0"/>
+                      </a:endParaRPr>
+                    </a:p>
+                  </a:txBody>
+                  <a:tcPr marL="11191" marR="11191" marT="11191" marB="0" anchor="b">
+                    <a:lnL w="12700" cap="flat" cmpd="sng" algn="ctr">
+                      <a:solidFill>
+                        <a:schemeClr val="tx1"/>
+                      </a:solidFill>
+                      <a:prstDash val="solid"/>
+                      <a:round/>
+                      <a:headEnd type="none" w="med" len="med"/>
+                      <a:tailEnd type="none" w="med" len="med"/>
+                    </a:lnL>
+                    <a:lnR w="12700" cap="flat" cmpd="sng" algn="ctr">
+                      <a:solidFill>
+                        <a:schemeClr val="tx1"/>
+                      </a:solidFill>
+                      <a:prstDash val="solid"/>
+                      <a:round/>
+                      <a:headEnd type="none" w="med" len="med"/>
+                      <a:tailEnd type="none" w="med" len="med"/>
+                    </a:lnR>
+                    <a:lnT w="12700" cap="flat" cmpd="sng" algn="ctr">
+                      <a:solidFill>
+                        <a:schemeClr val="tx1"/>
+                      </a:solidFill>
+                      <a:prstDash val="solid"/>
+                      <a:round/>
+                      <a:headEnd type="none" w="med" len="med"/>
+                      <a:tailEnd type="none" w="med" len="med"/>
+                    </a:lnT>
+                    <a:lnB w="38100" cap="flat" cmpd="sng" algn="ctr">
+                      <a:solidFill>
+                        <a:schemeClr val="tx1"/>
+                      </a:solidFill>
+                      <a:prstDash val="solid"/>
+                      <a:round/>
+                      <a:headEnd type="none" w="med" len="med"/>
+                      <a:tailEnd type="none" w="med" len="med"/>
+                    </a:lnB>
+                    <a:noFill/>
+                  </a:tcPr>
+                </a:tc>
+                <a:tc>
+                  <a:txBody>
+                    <a:bodyPr/>
+                    <a:lstStyle/>
+                    <a:p>
+                      <a:pPr algn="r" fontAlgn="b"/>
+                      <a:r>
+                        <a:rPr lang="en-SG" sz="1800" u="none" strike="noStrike" dirty="0">
+                          <a:effectLst/>
+                        </a:rPr>
+                        <a:t>200</a:t>
+                      </a:r>
+                      <a:endParaRPr lang="en-SG" sz="1800" b="0" i="0" u="none" strike="noStrike" dirty="0">
+                        <a:solidFill>
+                          <a:srgbClr val="000000"/>
+                        </a:solidFill>
+                        <a:effectLst/>
+                        <a:latin typeface="Calibri" panose="020F0502020204030204" pitchFamily="34" charset="0"/>
+                      </a:endParaRPr>
+                    </a:p>
+                  </a:txBody>
+                  <a:tcPr marL="11191" marR="11191" marT="11191" marB="0" anchor="b">
+                    <a:lnL w="12700" cap="flat" cmpd="sng" algn="ctr">
+                      <a:solidFill>
+                        <a:schemeClr val="tx1"/>
+                      </a:solidFill>
+                      <a:prstDash val="solid"/>
+                      <a:round/>
+                      <a:headEnd type="none" w="med" len="med"/>
+                      <a:tailEnd type="none" w="med" len="med"/>
+                    </a:lnL>
+                    <a:lnR w="12700" cap="flat" cmpd="sng" algn="ctr">
+                      <a:solidFill>
+                        <a:schemeClr val="tx1"/>
+                      </a:solidFill>
+                      <a:prstDash val="solid"/>
+                      <a:round/>
+                      <a:headEnd type="none" w="med" len="med"/>
+                      <a:tailEnd type="none" w="med" len="med"/>
+                    </a:lnR>
+                    <a:lnT w="12700" cap="flat" cmpd="sng" algn="ctr">
+                      <a:solidFill>
+                        <a:schemeClr val="tx1"/>
+                      </a:solidFill>
+                      <a:prstDash val="solid"/>
+                      <a:round/>
+                      <a:headEnd type="none" w="med" len="med"/>
+                      <a:tailEnd type="none" w="med" len="med"/>
+                    </a:lnT>
+                    <a:lnB w="38100" cap="flat" cmpd="sng" algn="ctr">
+                      <a:solidFill>
+                        <a:schemeClr val="tx1"/>
+                      </a:solidFill>
+                      <a:prstDash val="solid"/>
+                      <a:round/>
+                      <a:headEnd type="none" w="med" len="med"/>
+                      <a:tailEnd type="none" w="med" len="med"/>
+                    </a:lnB>
+                    <a:noFill/>
+                  </a:tcPr>
+                </a:tc>
+                <a:tc>
+                  <a:txBody>
+                    <a:bodyPr/>
+                    <a:lstStyle/>
+                    <a:p>
+                      <a:pPr algn="r" fontAlgn="b"/>
+                      <a:r>
+                        <a:rPr lang="en-SG" sz="1800" u="none" strike="noStrike" dirty="0">
+                          <a:effectLst/>
+                        </a:rPr>
+                        <a:t>120</a:t>
+                      </a:r>
+                      <a:endParaRPr lang="en-SG" sz="1800" b="0" i="0" u="none" strike="noStrike" dirty="0">
+                        <a:solidFill>
+                          <a:srgbClr val="000000"/>
+                        </a:solidFill>
+                        <a:effectLst/>
+                        <a:latin typeface="Calibri" panose="020F0502020204030204" pitchFamily="34" charset="0"/>
+                      </a:endParaRPr>
+                    </a:p>
+                  </a:txBody>
+                  <a:tcPr marL="11191" marR="11191" marT="11191" marB="0" anchor="b">
+                    <a:lnL w="12700" cap="flat" cmpd="sng" algn="ctr">
+                      <a:solidFill>
+                        <a:schemeClr val="tx1"/>
+                      </a:solidFill>
+                      <a:prstDash val="solid"/>
+                      <a:round/>
+                      <a:headEnd type="none" w="med" len="med"/>
+                      <a:tailEnd type="none" w="med" len="med"/>
+                    </a:lnL>
+                    <a:lnR w="12700" cap="flat" cmpd="sng" algn="ctr">
+                      <a:solidFill>
+                        <a:schemeClr val="tx1"/>
+                      </a:solidFill>
+                      <a:prstDash val="solid"/>
+                      <a:round/>
+                      <a:headEnd type="none" w="med" len="med"/>
+                      <a:tailEnd type="none" w="med" len="med"/>
+                    </a:lnR>
+                    <a:lnT w="12700" cap="flat" cmpd="sng" algn="ctr">
+                      <a:solidFill>
+                        <a:schemeClr val="tx1"/>
+                      </a:solidFill>
+                      <a:prstDash val="solid"/>
+                      <a:round/>
+                      <a:headEnd type="none" w="med" len="med"/>
+                      <a:tailEnd type="none" w="med" len="med"/>
+                    </a:lnT>
+                    <a:lnB w="38100" cap="flat" cmpd="sng" algn="ctr">
+                      <a:solidFill>
+                        <a:schemeClr val="tx1"/>
+                      </a:solidFill>
+                      <a:prstDash val="solid"/>
+                      <a:round/>
+                      <a:headEnd type="none" w="med" len="med"/>
+                      <a:tailEnd type="none" w="med" len="med"/>
+                    </a:lnB>
+                    <a:noFill/>
+                  </a:tcPr>
+                </a:tc>
+                <a:tc>
+                  <a:txBody>
+                    <a:bodyPr/>
+                    <a:lstStyle/>
+                    <a:p>
+                      <a:pPr algn="r" fontAlgn="b"/>
+                      <a:r>
+                        <a:rPr lang="en-SG" sz="1800" u="none" strike="noStrike" dirty="0">
+                          <a:effectLst/>
+                        </a:rPr>
+                        <a:t>24000</a:t>
+                      </a:r>
+                      <a:endParaRPr lang="en-SG" sz="1800" b="0" i="0" u="none" strike="noStrike" dirty="0">
+                        <a:solidFill>
+                          <a:srgbClr val="000000"/>
+                        </a:solidFill>
+                        <a:effectLst/>
+                        <a:latin typeface="Calibri" panose="020F0502020204030204" pitchFamily="34" charset="0"/>
+                      </a:endParaRPr>
+                    </a:p>
+                  </a:txBody>
+                  <a:tcPr marL="11191" marR="11191" marT="11191" marB="0" anchor="b">
+                    <a:lnL w="12700" cap="flat" cmpd="sng" algn="ctr">
+                      <a:solidFill>
+                        <a:schemeClr val="tx1"/>
+                      </a:solidFill>
+                      <a:prstDash val="solid"/>
+                      <a:round/>
+                      <a:headEnd type="none" w="med" len="med"/>
+                      <a:tailEnd type="none" w="med" len="med"/>
+                    </a:lnL>
+                    <a:lnR w="12700" cap="flat" cmpd="sng" algn="ctr">
+                      <a:solidFill>
+                        <a:schemeClr val="tx1"/>
+                      </a:solidFill>
+                      <a:prstDash val="solid"/>
+                      <a:round/>
+                      <a:headEnd type="none" w="med" len="med"/>
+                      <a:tailEnd type="none" w="med" len="med"/>
+                    </a:lnR>
+                    <a:lnT w="12700" cap="flat" cmpd="sng" algn="ctr">
+                      <a:solidFill>
+                        <a:schemeClr val="tx1"/>
+                      </a:solidFill>
+                      <a:prstDash val="solid"/>
+                      <a:round/>
+                      <a:headEnd type="none" w="med" len="med"/>
+                      <a:tailEnd type="none" w="med" len="med"/>
+                    </a:lnT>
+                    <a:lnB w="38100" cap="flat" cmpd="sng" algn="ctr">
+                      <a:solidFill>
+                        <a:schemeClr val="tx1"/>
+                      </a:solidFill>
+                      <a:prstDash val="solid"/>
+                      <a:round/>
+                      <a:headEnd type="none" w="med" len="med"/>
+                      <a:tailEnd type="none" w="med" len="med"/>
+                    </a:lnB>
+                    <a:noFill/>
+                  </a:tcPr>
+                </a:tc>
+                <a:extLst>
+                  <a:ext uri="{0D108BD9-81ED-4DB2-BD59-A6C34878D82A}">
+                    <a16:rowId xmlns:a16="http://schemas.microsoft.com/office/drawing/2014/main" val="2896046661"/>
+                  </a:ext>
+                </a:extLst>
+              </a:tr>
+              <a:tr h="290978">
+                <a:tc gridSpan="4">
+                  <a:txBody>
+                    <a:bodyPr/>
+                    <a:lstStyle/>
+                    <a:p>
+                      <a:pPr algn="l" fontAlgn="b"/>
+                      <a:r>
+                        <a:rPr lang="en-SG" sz="1800" b="1" u="none" strike="noStrike" dirty="0">
+                          <a:effectLst/>
+                        </a:rPr>
+                        <a:t>Total Manpower Cost</a:t>
+                      </a:r>
+                      <a:endParaRPr lang="en-SG" sz="1800" b="1" i="0" u="none" strike="noStrike" dirty="0">
+                        <a:solidFill>
+                          <a:srgbClr val="000000"/>
+                        </a:solidFill>
+                        <a:effectLst/>
+                        <a:latin typeface="Calibri" panose="020F0502020204030204" pitchFamily="34" charset="0"/>
+                      </a:endParaRPr>
+                    </a:p>
+                  </a:txBody>
+                  <a:tcPr marL="134297" marR="134297" marT="67149" marB="67149" anchor="b">
+                    <a:lnL w="12700" cap="flat" cmpd="sng" algn="ctr">
+                      <a:solidFill>
+                        <a:schemeClr val="tx1"/>
+                      </a:solidFill>
+                      <a:prstDash val="solid"/>
+                      <a:round/>
+                      <a:headEnd type="none" w="med" len="med"/>
+                      <a:tailEnd type="none" w="med" len="med"/>
+                    </a:lnL>
+                    <a:lnR w="12700" cap="flat" cmpd="sng" algn="ctr">
+                      <a:solidFill>
+                        <a:schemeClr val="tx1"/>
+                      </a:solidFill>
+                      <a:prstDash val="solid"/>
+                      <a:round/>
+                      <a:headEnd type="none" w="med" len="med"/>
+                      <a:tailEnd type="none" w="med" len="med"/>
+                    </a:lnR>
+                    <a:lnT w="38100" cap="flat" cmpd="sng" algn="ctr">
+                      <a:solidFill>
+                        <a:schemeClr val="tx1"/>
+                      </a:solidFill>
+                      <a:prstDash val="solid"/>
+                      <a:round/>
+                      <a:headEnd type="none" w="med" len="med"/>
+                      <a:tailEnd type="none" w="med" len="med"/>
+                    </a:lnT>
+                    <a:lnB w="12700" cap="flat" cmpd="sng" algn="ctr">
+                      <a:solidFill>
+                        <a:schemeClr val="tx1"/>
+                      </a:solidFill>
+                      <a:prstDash val="solid"/>
+                      <a:round/>
+                      <a:headEnd type="none" w="med" len="med"/>
+                      <a:tailEnd type="none" w="med" len="med"/>
+                    </a:lnB>
+                    <a:noFill/>
+                  </a:tcPr>
+                </a:tc>
+                <a:tc hMerge="1">
+                  <a:txBody>
+                    <a:bodyPr/>
+                    <a:lstStyle/>
+                    <a:p>
+                      <a:endParaRPr lang="en-SG"/>
+                    </a:p>
+                  </a:txBody>
+                  <a:tcPr/>
+                </a:tc>
+                <a:tc hMerge="1">
+                  <a:txBody>
+                    <a:bodyPr/>
+                    <a:lstStyle/>
+                    <a:p>
+                      <a:endParaRPr lang="en-SG"/>
+                    </a:p>
+                  </a:txBody>
+                  <a:tcPr/>
+                </a:tc>
+                <a:tc hMerge="1">
+                  <a:txBody>
+                    <a:bodyPr/>
+                    <a:lstStyle/>
+                    <a:p>
+                      <a:endParaRPr lang="en-SG"/>
+                    </a:p>
+                  </a:txBody>
+                  <a:tcPr/>
+                </a:tc>
+                <a:tc>
+                  <a:txBody>
+                    <a:bodyPr/>
+                    <a:lstStyle/>
+                    <a:p>
+                      <a:pPr algn="r" fontAlgn="b"/>
+                      <a:r>
+                        <a:rPr lang="en-SG" sz="1800" u="none" strike="noStrike" dirty="0">
+                          <a:effectLst/>
+                        </a:rPr>
+                        <a:t>193000</a:t>
+                      </a:r>
+                      <a:endParaRPr lang="en-SG" sz="1800" b="0" i="0" u="none" strike="noStrike" dirty="0">
+                        <a:solidFill>
+                          <a:srgbClr val="000000"/>
+                        </a:solidFill>
+                        <a:effectLst/>
+                        <a:latin typeface="Calibri" panose="020F0502020204030204" pitchFamily="34" charset="0"/>
+                      </a:endParaRPr>
+                    </a:p>
+                  </a:txBody>
+                  <a:tcPr marL="11191" marR="11191" marT="11191" marB="0" anchor="b">
+                    <a:lnL w="12700" cap="flat" cmpd="sng" algn="ctr">
+                      <a:solidFill>
+                        <a:schemeClr val="tx1"/>
+                      </a:solidFill>
+                      <a:prstDash val="solid"/>
+                      <a:round/>
+                      <a:headEnd type="none" w="med" len="med"/>
+                      <a:tailEnd type="none" w="med" len="med"/>
+                    </a:lnL>
+                    <a:lnR w="12700" cap="flat" cmpd="sng" algn="ctr">
+                      <a:solidFill>
+                        <a:schemeClr val="tx1"/>
+                      </a:solidFill>
+                      <a:prstDash val="solid"/>
+                      <a:round/>
+                      <a:headEnd type="none" w="med" len="med"/>
+                      <a:tailEnd type="none" w="med" len="med"/>
+                    </a:lnR>
+                    <a:lnT w="38100" cap="flat" cmpd="sng" algn="ctr">
+                      <a:solidFill>
+                        <a:schemeClr val="tx1"/>
+                      </a:solidFill>
+                      <a:prstDash val="solid"/>
+                      <a:round/>
+                      <a:headEnd type="none" w="med" len="med"/>
+                      <a:tailEnd type="none" w="med" len="med"/>
+                    </a:lnT>
+                    <a:lnB w="12700" cap="flat" cmpd="sng" algn="ctr">
+                      <a:solidFill>
+                        <a:schemeClr val="tx1"/>
+                      </a:solidFill>
+                      <a:prstDash val="solid"/>
+                      <a:round/>
+                      <a:headEnd type="none" w="med" len="med"/>
+                      <a:tailEnd type="none" w="med" len="med"/>
+                    </a:lnB>
+                    <a:noFill/>
+                  </a:tcPr>
+                </a:tc>
+                <a:extLst>
+                  <a:ext uri="{0D108BD9-81ED-4DB2-BD59-A6C34878D82A}">
+                    <a16:rowId xmlns:a16="http://schemas.microsoft.com/office/drawing/2014/main" val="275691183"/>
+                  </a:ext>
+                </a:extLst>
+              </a:tr>
+              <a:tr h="290978">
+                <a:tc gridSpan="4">
+                  <a:txBody>
+                    <a:bodyPr/>
+                    <a:lstStyle/>
+                    <a:p>
+                      <a:pPr algn="l" fontAlgn="b"/>
+                      <a:r>
+                        <a:rPr lang="en-SG" sz="1800" b="1" u="none" strike="noStrike" dirty="0">
+                          <a:effectLst/>
+                        </a:rPr>
+                        <a:t>Lump Sum Misc. Cost (e.g. stakeholder engagement, transportation)</a:t>
+                      </a:r>
+                      <a:endParaRPr lang="en-SG" sz="1800" b="1" i="0" u="none" strike="noStrike" dirty="0">
+                        <a:solidFill>
+                          <a:srgbClr val="000000"/>
+                        </a:solidFill>
+                        <a:effectLst/>
+                        <a:latin typeface="Calibri" panose="020F0502020204030204" pitchFamily="34" charset="0"/>
+                      </a:endParaRPr>
+                    </a:p>
+                  </a:txBody>
+                  <a:tcPr marL="134297" marR="134297" marT="67149" marB="67149" anchor="b">
+                    <a:lnL w="12700" cap="flat" cmpd="sng" algn="ctr">
+                      <a:solidFill>
+                        <a:schemeClr val="tx1"/>
+                      </a:solidFill>
+                      <a:prstDash val="solid"/>
+                      <a:round/>
+                      <a:headEnd type="none" w="med" len="med"/>
+                      <a:tailEnd type="none" w="med" len="med"/>
+                    </a:lnL>
+                    <a:lnR w="12700" cap="flat" cmpd="sng" algn="ctr">
+                      <a:solidFill>
+                        <a:schemeClr val="tx1"/>
+                      </a:solidFill>
+                      <a:prstDash val="solid"/>
+                      <a:round/>
+                      <a:headEnd type="none" w="med" len="med"/>
+                      <a:tailEnd type="none" w="med" len="med"/>
+                    </a:lnR>
+                    <a:lnT w="12700" cap="flat" cmpd="sng" algn="ctr">
+                      <a:solidFill>
+                        <a:schemeClr val="tx1"/>
+                      </a:solidFill>
+                      <a:prstDash val="solid"/>
+                      <a:round/>
+                      <a:headEnd type="none" w="med" len="med"/>
+                      <a:tailEnd type="none" w="med" len="med"/>
+                    </a:lnT>
+                    <a:lnB w="12700" cap="flat" cmpd="sng" algn="ctr">
+                      <a:solidFill>
+                        <a:schemeClr val="tx1"/>
+                      </a:solidFill>
+                      <a:prstDash val="solid"/>
+                      <a:round/>
+                      <a:headEnd type="none" w="med" len="med"/>
+                      <a:tailEnd type="none" w="med" len="med"/>
+                    </a:lnB>
+                    <a:noFill/>
+                  </a:tcPr>
+                </a:tc>
+                <a:tc hMerge="1">
+                  <a:txBody>
+                    <a:bodyPr/>
+                    <a:lstStyle/>
+                    <a:p>
+                      <a:endParaRPr lang="en-SG"/>
+                    </a:p>
+                  </a:txBody>
+                  <a:tcPr/>
+                </a:tc>
+                <a:tc hMerge="1">
+                  <a:txBody>
+                    <a:bodyPr/>
+                    <a:lstStyle/>
+                    <a:p>
+                      <a:endParaRPr lang="en-SG"/>
+                    </a:p>
+                  </a:txBody>
+                  <a:tcPr/>
+                </a:tc>
+                <a:tc hMerge="1">
+                  <a:txBody>
+                    <a:bodyPr/>
+                    <a:lstStyle/>
+                    <a:p>
+                      <a:endParaRPr lang="en-SG"/>
+                    </a:p>
+                  </a:txBody>
+                  <a:tcPr/>
+                </a:tc>
+                <a:tc>
+                  <a:txBody>
+                    <a:bodyPr/>
+                    <a:lstStyle/>
+                    <a:p>
+                      <a:pPr algn="r" fontAlgn="b"/>
+                      <a:r>
+                        <a:rPr lang="en-SG" sz="1800" u="none" strike="noStrike" dirty="0">
+                          <a:effectLst/>
+                        </a:rPr>
+                        <a:t>10000</a:t>
+                      </a:r>
+                      <a:endParaRPr lang="en-SG" sz="1800" b="0" i="0" u="none" strike="noStrike" dirty="0">
+                        <a:solidFill>
+                          <a:srgbClr val="000000"/>
+                        </a:solidFill>
+                        <a:effectLst/>
+                        <a:latin typeface="Calibri" panose="020F0502020204030204" pitchFamily="34" charset="0"/>
+                      </a:endParaRPr>
+                    </a:p>
+                  </a:txBody>
+                  <a:tcPr marL="11191" marR="11191" marT="11191" marB="0" anchor="b">
+                    <a:lnL w="12700" cap="flat" cmpd="sng" algn="ctr">
+                      <a:solidFill>
+                        <a:schemeClr val="tx1"/>
+                      </a:solidFill>
+                      <a:prstDash val="solid"/>
+                      <a:round/>
+                      <a:headEnd type="none" w="med" len="med"/>
+                      <a:tailEnd type="none" w="med" len="med"/>
+                    </a:lnL>
+                    <a:lnR w="12700" cap="flat" cmpd="sng" algn="ctr">
+                      <a:solidFill>
+                        <a:schemeClr val="tx1"/>
+                      </a:solidFill>
+                      <a:prstDash val="solid"/>
+                      <a:round/>
+                      <a:headEnd type="none" w="med" len="med"/>
+                      <a:tailEnd type="none" w="med" len="med"/>
+                    </a:lnR>
+                    <a:lnT w="12700" cap="flat" cmpd="sng" algn="ctr">
+                      <a:solidFill>
+                        <a:schemeClr val="tx1"/>
+                      </a:solidFill>
+                      <a:prstDash val="solid"/>
+                      <a:round/>
+                      <a:headEnd type="none" w="med" len="med"/>
+                      <a:tailEnd type="none" w="med" len="med"/>
+                    </a:lnT>
+                    <a:lnB w="12700" cap="flat" cmpd="sng" algn="ctr">
+                      <a:solidFill>
+                        <a:schemeClr val="tx1"/>
+                      </a:solidFill>
+                      <a:prstDash val="solid"/>
+                      <a:round/>
+                      <a:headEnd type="none" w="med" len="med"/>
+                      <a:tailEnd type="none" w="med" len="med"/>
+                    </a:lnB>
+                    <a:noFill/>
+                  </a:tcPr>
+                </a:tc>
+                <a:extLst>
+                  <a:ext uri="{0D108BD9-81ED-4DB2-BD59-A6C34878D82A}">
+                    <a16:rowId xmlns:a16="http://schemas.microsoft.com/office/drawing/2014/main" val="1029544338"/>
+                  </a:ext>
+                </a:extLst>
+              </a:tr>
+              <a:tr h="290978">
+                <a:tc gridSpan="4">
+                  <a:txBody>
+                    <a:bodyPr/>
+                    <a:lstStyle/>
+                    <a:p>
+                      <a:pPr algn="l" fontAlgn="b"/>
+                      <a:r>
+                        <a:rPr lang="en-SG" sz="1800" b="1" u="none" strike="noStrike" dirty="0">
+                          <a:effectLst/>
+                        </a:rPr>
+                        <a:t>Contingency (10%)</a:t>
+                      </a:r>
+                      <a:endParaRPr lang="en-SG" sz="1800" b="1" i="0" u="none" strike="noStrike" dirty="0">
+                        <a:solidFill>
+                          <a:srgbClr val="000000"/>
+                        </a:solidFill>
+                        <a:effectLst/>
+                        <a:latin typeface="Calibri" panose="020F0502020204030204" pitchFamily="34" charset="0"/>
+                      </a:endParaRPr>
+                    </a:p>
+                  </a:txBody>
+                  <a:tcPr marL="134297" marR="134297" marT="67149" marB="67149" anchor="b">
+                    <a:lnL w="12700" cap="flat" cmpd="sng" algn="ctr">
+                      <a:solidFill>
+                        <a:schemeClr val="tx1"/>
+                      </a:solidFill>
+                      <a:prstDash val="solid"/>
+                      <a:round/>
+                      <a:headEnd type="none" w="med" len="med"/>
+                      <a:tailEnd type="none" w="med" len="med"/>
+                    </a:lnL>
+                    <a:lnR w="12700" cap="flat" cmpd="sng" algn="ctr">
+                      <a:solidFill>
+                        <a:schemeClr val="tx1"/>
+                      </a:solidFill>
+                      <a:prstDash val="solid"/>
+                      <a:round/>
+                      <a:headEnd type="none" w="med" len="med"/>
+                      <a:tailEnd type="none" w="med" len="med"/>
+                    </a:lnR>
+                    <a:lnT w="12700" cap="flat" cmpd="sng" algn="ctr">
+                      <a:solidFill>
+                        <a:schemeClr val="tx1"/>
+                      </a:solidFill>
+                      <a:prstDash val="solid"/>
+                      <a:round/>
+                      <a:headEnd type="none" w="med" len="med"/>
+                      <a:tailEnd type="none" w="med" len="med"/>
+                    </a:lnT>
+                    <a:lnB w="38100" cap="flat" cmpd="sng" algn="ctr">
+                      <a:solidFill>
+                        <a:schemeClr val="tx1"/>
+                      </a:solidFill>
+                      <a:prstDash val="solid"/>
+                      <a:round/>
+                      <a:headEnd type="none" w="med" len="med"/>
+                      <a:tailEnd type="none" w="med" len="med"/>
+                    </a:lnB>
+                    <a:noFill/>
+                  </a:tcPr>
+                </a:tc>
+                <a:tc hMerge="1">
+                  <a:txBody>
+                    <a:bodyPr/>
+                    <a:lstStyle/>
+                    <a:p>
+                      <a:endParaRPr lang="en-SG"/>
+                    </a:p>
+                  </a:txBody>
+                  <a:tcPr/>
+                </a:tc>
+                <a:tc hMerge="1">
+                  <a:txBody>
+                    <a:bodyPr/>
+                    <a:lstStyle/>
+                    <a:p>
+                      <a:endParaRPr lang="en-SG"/>
+                    </a:p>
+                  </a:txBody>
+                  <a:tcPr/>
+                </a:tc>
+                <a:tc hMerge="1">
+                  <a:txBody>
+                    <a:bodyPr/>
+                    <a:lstStyle/>
+                    <a:p>
+                      <a:endParaRPr lang="en-SG"/>
+                    </a:p>
+                  </a:txBody>
+                  <a:tcPr/>
+                </a:tc>
+                <a:tc>
+                  <a:txBody>
+                    <a:bodyPr/>
+                    <a:lstStyle/>
+                    <a:p>
+                      <a:pPr algn="r" fontAlgn="b"/>
+                      <a:r>
+                        <a:rPr lang="en-SG" sz="1800" u="none" strike="noStrike" dirty="0">
+                          <a:effectLst/>
+                        </a:rPr>
+                        <a:t>20300</a:t>
+                      </a:r>
+                      <a:endParaRPr lang="en-SG" sz="1800" b="0" i="0" u="none" strike="noStrike" dirty="0">
+                        <a:solidFill>
+                          <a:srgbClr val="000000"/>
+                        </a:solidFill>
+                        <a:effectLst/>
+                        <a:latin typeface="Calibri" panose="020F0502020204030204" pitchFamily="34" charset="0"/>
+                      </a:endParaRPr>
+                    </a:p>
+                  </a:txBody>
+                  <a:tcPr marL="11191" marR="11191" marT="11191" marB="0" anchor="b">
+                    <a:lnL w="12700" cap="flat" cmpd="sng" algn="ctr">
+                      <a:solidFill>
+                        <a:schemeClr val="tx1"/>
+                      </a:solidFill>
+                      <a:prstDash val="solid"/>
+                      <a:round/>
+                      <a:headEnd type="none" w="med" len="med"/>
+                      <a:tailEnd type="none" w="med" len="med"/>
+                    </a:lnL>
+                    <a:lnR w="12700" cap="flat" cmpd="sng" algn="ctr">
+                      <a:solidFill>
+                        <a:schemeClr val="tx1"/>
+                      </a:solidFill>
+                      <a:prstDash val="solid"/>
+                      <a:round/>
+                      <a:headEnd type="none" w="med" len="med"/>
+                      <a:tailEnd type="none" w="med" len="med"/>
+                    </a:lnR>
+                    <a:lnT w="12700" cap="flat" cmpd="sng" algn="ctr">
+                      <a:solidFill>
+                        <a:schemeClr val="tx1"/>
+                      </a:solidFill>
+                      <a:prstDash val="solid"/>
+                      <a:round/>
+                      <a:headEnd type="none" w="med" len="med"/>
+                      <a:tailEnd type="none" w="med" len="med"/>
+                    </a:lnT>
+                    <a:lnB w="38100" cap="flat" cmpd="sng" algn="ctr">
+                      <a:solidFill>
+                        <a:schemeClr val="tx1"/>
+                      </a:solidFill>
+                      <a:prstDash val="solid"/>
+                      <a:round/>
+                      <a:headEnd type="none" w="med" len="med"/>
+                      <a:tailEnd type="none" w="med" len="med"/>
+                    </a:lnB>
+                    <a:noFill/>
+                  </a:tcPr>
+                </a:tc>
+                <a:extLst>
+                  <a:ext uri="{0D108BD9-81ED-4DB2-BD59-A6C34878D82A}">
+                    <a16:rowId xmlns:a16="http://schemas.microsoft.com/office/drawing/2014/main" val="1069688620"/>
+                  </a:ext>
+                </a:extLst>
+              </a:tr>
+              <a:tr h="290978">
+                <a:tc gridSpan="4">
+                  <a:txBody>
+                    <a:bodyPr/>
+                    <a:lstStyle/>
+                    <a:p>
+                      <a:pPr algn="ctr" fontAlgn="b"/>
+                      <a:r>
+                        <a:rPr lang="en-SG" sz="1800" b="1" u="none" strike="noStrike" dirty="0">
+                          <a:effectLst/>
+                        </a:rPr>
+                        <a:t>Overall Cost</a:t>
+                      </a:r>
+                      <a:endParaRPr lang="en-SG" sz="1800" b="1" i="0" u="none" strike="noStrike" dirty="0">
+                        <a:solidFill>
+                          <a:srgbClr val="000000"/>
+                        </a:solidFill>
+                        <a:effectLst/>
+                        <a:latin typeface="Calibri" panose="020F0502020204030204" pitchFamily="34" charset="0"/>
+                      </a:endParaRPr>
+                    </a:p>
+                  </a:txBody>
+                  <a:tcPr marL="134297" marR="134297" marT="67149" marB="67149" anchor="b">
+                    <a:lnL w="12700" cap="flat" cmpd="sng" algn="ctr">
+                      <a:solidFill>
+                        <a:schemeClr val="tx1"/>
+                      </a:solidFill>
+                      <a:prstDash val="solid"/>
+                      <a:round/>
+                      <a:headEnd type="none" w="med" len="med"/>
+                      <a:tailEnd type="none" w="med" len="med"/>
+                    </a:lnL>
+                    <a:lnR w="12700" cap="flat" cmpd="sng" algn="ctr">
+                      <a:solidFill>
+                        <a:schemeClr val="tx1"/>
+                      </a:solidFill>
+                      <a:prstDash val="solid"/>
+                      <a:round/>
+                      <a:headEnd type="none" w="med" len="med"/>
+                      <a:tailEnd type="none" w="med" len="med"/>
+                    </a:lnR>
+                    <a:lnT w="38100" cap="flat" cmpd="sng" algn="ctr">
+                      <a:solidFill>
+                        <a:schemeClr val="tx1"/>
+                      </a:solidFill>
+                      <a:prstDash val="solid"/>
+                      <a:round/>
+                      <a:headEnd type="none" w="med" len="med"/>
+                      <a:tailEnd type="none" w="med" len="med"/>
+                    </a:lnT>
+                    <a:lnB w="12700" cap="flat" cmpd="sng" algn="ctr">
+                      <a:solidFill>
+                        <a:schemeClr val="tx1"/>
+                      </a:solidFill>
+                      <a:prstDash val="solid"/>
+                      <a:round/>
+                      <a:headEnd type="none" w="med" len="med"/>
+                      <a:tailEnd type="none" w="med" len="med"/>
+                    </a:lnB>
+                    <a:noFill/>
+                  </a:tcPr>
+                </a:tc>
+                <a:tc hMerge="1">
+                  <a:txBody>
+                    <a:bodyPr/>
+                    <a:lstStyle/>
+                    <a:p>
+                      <a:endParaRPr lang="en-SG"/>
+                    </a:p>
+                  </a:txBody>
+                  <a:tcPr/>
+                </a:tc>
+                <a:tc hMerge="1">
+                  <a:txBody>
+                    <a:bodyPr/>
+                    <a:lstStyle/>
+                    <a:p>
+                      <a:endParaRPr lang="en-SG"/>
+                    </a:p>
+                  </a:txBody>
+                  <a:tcPr/>
+                </a:tc>
+                <a:tc hMerge="1">
+                  <a:txBody>
+                    <a:bodyPr/>
+                    <a:lstStyle/>
+                    <a:p>
+                      <a:endParaRPr lang="en-SG"/>
+                    </a:p>
+                  </a:txBody>
+                  <a:tcPr/>
+                </a:tc>
+                <a:tc>
+                  <a:txBody>
+                    <a:bodyPr/>
+                    <a:lstStyle/>
+                    <a:p>
+                      <a:pPr algn="r" fontAlgn="b"/>
+                      <a:r>
+                        <a:rPr lang="en-SG" sz="1800" u="none" strike="noStrike" dirty="0">
+                          <a:effectLst/>
+                        </a:rPr>
+                        <a:t>223300</a:t>
+                      </a:r>
+                      <a:endParaRPr lang="en-SG" sz="1800" b="1" i="0" u="none" strike="noStrike" dirty="0">
+                        <a:solidFill>
+                          <a:srgbClr val="000000"/>
+                        </a:solidFill>
+                        <a:effectLst/>
+                        <a:latin typeface="Calibri" panose="020F0502020204030204" pitchFamily="34" charset="0"/>
+                      </a:endParaRPr>
+                    </a:p>
+                  </a:txBody>
+                  <a:tcPr marL="11191" marR="11191" marT="11191" marB="0" anchor="b">
+                    <a:lnL w="12700" cap="flat" cmpd="sng" algn="ctr">
+                      <a:solidFill>
+                        <a:schemeClr val="tx1"/>
+                      </a:solidFill>
+                      <a:prstDash val="solid"/>
+                      <a:round/>
+                      <a:headEnd type="none" w="med" len="med"/>
+                      <a:tailEnd type="none" w="med" len="med"/>
+                    </a:lnL>
+                    <a:lnR w="12700" cap="flat" cmpd="sng" algn="ctr">
+                      <a:solidFill>
+                        <a:schemeClr val="tx1"/>
+                      </a:solidFill>
+                      <a:prstDash val="solid"/>
+                      <a:round/>
+                      <a:headEnd type="none" w="med" len="med"/>
+                      <a:tailEnd type="none" w="med" len="med"/>
+                    </a:lnR>
+                    <a:lnT w="38100" cap="flat" cmpd="sng" algn="ctr">
+                      <a:solidFill>
+                        <a:schemeClr val="tx1"/>
+                      </a:solidFill>
+                      <a:prstDash val="solid"/>
+                      <a:round/>
+                      <a:headEnd type="none" w="med" len="med"/>
+                      <a:tailEnd type="none" w="med" len="med"/>
+                    </a:lnT>
+                    <a:lnB w="12700" cap="flat" cmpd="sng" algn="ctr">
+                      <a:solidFill>
+                        <a:schemeClr val="tx1"/>
+                      </a:solidFill>
+                      <a:prstDash val="solid"/>
+                      <a:round/>
+                      <a:headEnd type="none" w="med" len="med"/>
+                      <a:tailEnd type="none" w="med" len="med"/>
+                    </a:lnB>
+                    <a:noFill/>
+                  </a:tcPr>
+                </a:tc>
+                <a:extLst>
+                  <a:ext uri="{0D108BD9-81ED-4DB2-BD59-A6C34878D82A}">
+                    <a16:rowId xmlns:a16="http://schemas.microsoft.com/office/drawing/2014/main" val="1177937824"/>
+                  </a:ext>
+                </a:extLst>
+              </a:tr>
+            </a:tbl>
+          </a:graphicData>
+        </a:graphic>
+      </p:graphicFrame>
+    </p:spTree>
+    <p:extLst>
+      <p:ext uri="{BB962C8B-B14F-4D97-AF65-F5344CB8AC3E}">
+        <p14:creationId xmlns:p14="http://schemas.microsoft.com/office/powerpoint/2010/main" val="1631865187"/>
+      </p:ext>
+    </p:extLst>
+  </p:cSld>
+  <p:clrMapOvr>
+    <a:masterClrMapping/>
+  </p:clrMapOvr>
+</p:sld>
+</file>
+
+<file path=ppt/slides/slide5.xml><?xml version="1.0" encoding="utf-8"?>
+<p:sld xmlns:a="http://schemas.openxmlformats.org/drawingml/2006/main" xmlns:r="http://schemas.openxmlformats.org/officeDocument/2006/relationships" xmlns:p="http://schemas.openxmlformats.org/presentationml/2006/main">
+  <p:cSld>
+    <p:spTree>
+      <p:nvGrpSpPr>
+        <p:cNvPr id="1" name=""/>
+        <p:cNvGrpSpPr/>
+        <p:nvPr/>
+      </p:nvGrpSpPr>
+      <p:grpSpPr>
+        <a:xfrm>
+          <a:off x="0" y="0"/>
+          <a:ext cx="0" cy="0"/>
+          <a:chOff x="0" y="0"/>
+          <a:chExt cx="0" cy="0"/>
+        </a:xfrm>
+      </p:grpSpPr>
+      <p:graphicFrame>
+        <p:nvGraphicFramePr>
+          <p:cNvPr id="6" name="Table 5">
+            <a:extLst>
+              <a:ext uri="{FF2B5EF4-FFF2-40B4-BE49-F238E27FC236}">
+                <a16:creationId xmlns:a16="http://schemas.microsoft.com/office/drawing/2014/main" id="{18BF75F3-AFC2-6DF7-79BA-E3053E06925C}"/>
+              </a:ext>
+            </a:extLst>
+          </p:cNvPr>
+          <p:cNvGraphicFramePr>
+            <a:graphicFrameLocks noGrp="1"/>
+          </p:cNvGraphicFramePr>
+          <p:nvPr>
+            <p:extLst>
+              <p:ext uri="{D42A27DB-BD31-4B8C-83A1-F6EECF244321}">
+                <p14:modId xmlns:p14="http://schemas.microsoft.com/office/powerpoint/2010/main" val="332972640"/>
+              </p:ext>
+            </p:extLst>
+          </p:nvPr>
+        </p:nvGraphicFramePr>
+        <p:xfrm>
+          <a:off x="3111500" y="3033713"/>
+          <a:ext cx="5969000" cy="792480"/>
+        </p:xfrm>
+        <a:graphic>
+          <a:graphicData uri="http://schemas.openxmlformats.org/drawingml/2006/table">
+            <a:tbl>
+              <a:tblPr>
+                <a:tableStyleId>{5C22544A-7EE6-4342-B048-85BDC9FD1C3A}</a:tableStyleId>
+              </a:tblPr>
+              <a:tblGrid>
+                <a:gridCol w="2717800">
+                  <a:extLst>
+                    <a:ext uri="{9D8B030D-6E8A-4147-A177-3AD203B41FA5}">
+                      <a16:colId xmlns:a16="http://schemas.microsoft.com/office/drawing/2014/main" val="1805908453"/>
+                    </a:ext>
+                  </a:extLst>
+                </a:gridCol>
+                <a:gridCol w="3251200">
+                  <a:extLst>
+                    <a:ext uri="{9D8B030D-6E8A-4147-A177-3AD203B41FA5}">
+                      <a16:colId xmlns:a16="http://schemas.microsoft.com/office/drawing/2014/main" val="1127161962"/>
+                    </a:ext>
+                  </a:extLst>
+                </a:gridCol>
+              </a:tblGrid>
+              <a:tr h="198120">
+                <a:tc>
+                  <a:txBody>
+                    <a:bodyPr/>
+                    <a:lstStyle/>
+                    <a:p>
+                      <a:pPr algn="l" fontAlgn="b"/>
+                      <a:r>
+                        <a:rPr lang="en-SG" sz="1200" b="1" u="none" strike="noStrike" dirty="0">
+                          <a:effectLst/>
+                        </a:rPr>
+                        <a:t>Additional Services</a:t>
+                      </a:r>
+                      <a:endParaRPr lang="en-SG" sz="1200" b="1" i="0" u="none" strike="noStrike" dirty="0">
+                        <a:solidFill>
+                          <a:srgbClr val="000000"/>
+                        </a:solidFill>
+                        <a:effectLst/>
+                        <a:latin typeface="Calibri" panose="020F0502020204030204" pitchFamily="34" charset="0"/>
+                      </a:endParaRPr>
+                    </a:p>
+                  </a:txBody>
+                  <a:tcPr marL="7620" marR="7620" marT="7620" marB="0" anchor="b">
+                    <a:lnL w="12700" cap="flat" cmpd="sng" algn="ctr">
+                      <a:solidFill>
+                        <a:schemeClr val="tx1"/>
+                      </a:solidFill>
+                      <a:prstDash val="solid"/>
+                      <a:round/>
+                      <a:headEnd type="none" w="med" len="med"/>
+                      <a:tailEnd type="none" w="med" len="med"/>
+                    </a:lnL>
+                    <a:lnR w="12700" cap="flat" cmpd="sng" algn="ctr">
+                      <a:solidFill>
+                        <a:schemeClr val="tx1"/>
+                      </a:solidFill>
+                      <a:prstDash val="solid"/>
+                      <a:round/>
+                      <a:headEnd type="none" w="med" len="med"/>
+                      <a:tailEnd type="none" w="med" len="med"/>
+                    </a:lnR>
+                    <a:lnT w="12700" cap="flat" cmpd="sng" algn="ctr">
+                      <a:solidFill>
+                        <a:schemeClr val="tx1"/>
+                      </a:solidFill>
+                      <a:prstDash val="solid"/>
+                      <a:round/>
+                      <a:headEnd type="none" w="med" len="med"/>
+                      <a:tailEnd type="none" w="med" len="med"/>
+                    </a:lnT>
+                    <a:lnB w="12700" cap="flat" cmpd="sng" algn="ctr">
+                      <a:solidFill>
+                        <a:schemeClr val="tx1"/>
+                      </a:solidFill>
+                      <a:prstDash val="solid"/>
+                      <a:round/>
+                      <a:headEnd type="none" w="med" len="med"/>
+                      <a:tailEnd type="none" w="med" len="med"/>
+                    </a:lnB>
+                    <a:lnTlToBr w="12700" cmpd="sng">
+                      <a:noFill/>
+                      <a:prstDash val="solid"/>
+                    </a:lnTlToBr>
+                    <a:lnBlToTr w="12700" cmpd="sng">
+                      <a:noFill/>
+                      <a:prstDash val="solid"/>
+                    </a:lnBlToTr>
+                    <a:noFill/>
+                  </a:tcPr>
+                </a:tc>
+                <a:tc>
+                  <a:txBody>
+                    <a:bodyPr/>
+                    <a:lstStyle/>
+                    <a:p>
+                      <a:pPr algn="l" fontAlgn="b"/>
+                      <a:r>
+                        <a:rPr lang="en-SG" sz="1200" b="1" u="none" strike="noStrike" dirty="0">
+                          <a:effectLst/>
+                        </a:rPr>
+                        <a:t>Cost</a:t>
+                      </a:r>
+                      <a:endParaRPr lang="en-SG" sz="1200" b="1" i="0" u="none" strike="noStrike" dirty="0">
+                        <a:solidFill>
+                          <a:srgbClr val="000000"/>
+                        </a:solidFill>
+                        <a:effectLst/>
+                        <a:latin typeface="Calibri" panose="020F0502020204030204" pitchFamily="34" charset="0"/>
+                      </a:endParaRPr>
+                    </a:p>
+                  </a:txBody>
+                  <a:tcPr marL="7620" marR="7620" marT="7620" marB="0" anchor="b">
+                    <a:lnL w="12700" cap="flat" cmpd="sng" algn="ctr">
+                      <a:solidFill>
+                        <a:schemeClr val="tx1"/>
+                      </a:solidFill>
+                      <a:prstDash val="solid"/>
+                      <a:round/>
+                      <a:headEnd type="none" w="med" len="med"/>
+                      <a:tailEnd type="none" w="med" len="med"/>
+                    </a:lnL>
+                    <a:lnR w="12700" cap="flat" cmpd="sng" algn="ctr">
+                      <a:solidFill>
+                        <a:schemeClr val="tx1"/>
+                      </a:solidFill>
+                      <a:prstDash val="solid"/>
+                      <a:round/>
+                      <a:headEnd type="none" w="med" len="med"/>
+                      <a:tailEnd type="none" w="med" len="med"/>
+                    </a:lnR>
+                    <a:lnT w="12700" cap="flat" cmpd="sng" algn="ctr">
+                      <a:solidFill>
+                        <a:schemeClr val="tx1"/>
+                      </a:solidFill>
+                      <a:prstDash val="solid"/>
+                      <a:round/>
+                      <a:headEnd type="none" w="med" len="med"/>
+                      <a:tailEnd type="none" w="med" len="med"/>
+                    </a:lnT>
+                    <a:lnB w="12700" cap="flat" cmpd="sng" algn="ctr">
+                      <a:solidFill>
+                        <a:schemeClr val="tx1"/>
+                      </a:solidFill>
+                      <a:prstDash val="solid"/>
+                      <a:round/>
+                      <a:headEnd type="none" w="med" len="med"/>
+                      <a:tailEnd type="none" w="med" len="med"/>
+                    </a:lnB>
+                    <a:lnTlToBr w="12700" cmpd="sng">
+                      <a:noFill/>
+                      <a:prstDash val="solid"/>
+                    </a:lnTlToBr>
+                    <a:lnBlToTr w="12700" cmpd="sng">
+                      <a:noFill/>
+                      <a:prstDash val="solid"/>
+                    </a:lnBlToTr>
+                    <a:noFill/>
+                  </a:tcPr>
+                </a:tc>
+                <a:extLst>
+                  <a:ext uri="{0D108BD9-81ED-4DB2-BD59-A6C34878D82A}">
+                    <a16:rowId xmlns:a16="http://schemas.microsoft.com/office/drawing/2014/main" val="2531191713"/>
+                  </a:ext>
+                </a:extLst>
+              </a:tr>
+              <a:tr h="198120">
+                <a:tc>
+                  <a:txBody>
+                    <a:bodyPr/>
+                    <a:lstStyle/>
+                    <a:p>
+                      <a:pPr algn="l" fontAlgn="b"/>
+                      <a:r>
+                        <a:rPr lang="en-SG" sz="1200" u="none" strike="noStrike" dirty="0">
+                          <a:effectLst/>
+                        </a:rPr>
+                        <a:t>Botanist</a:t>
+                      </a:r>
+                      <a:endParaRPr lang="en-SG" sz="1200" b="0" i="0" u="none" strike="noStrike" dirty="0">
+                        <a:solidFill>
+                          <a:srgbClr val="000000"/>
+                        </a:solidFill>
+                        <a:effectLst/>
+                        <a:latin typeface="Calibri" panose="020F0502020204030204" pitchFamily="34" charset="0"/>
+                      </a:endParaRPr>
+                    </a:p>
+                  </a:txBody>
+                  <a:tcPr marL="7620" marR="7620" marT="7620" marB="0" anchor="b">
+                    <a:lnL w="12700" cap="flat" cmpd="sng" algn="ctr">
+                      <a:solidFill>
+                        <a:schemeClr val="tx1"/>
+                      </a:solidFill>
+                      <a:prstDash val="solid"/>
+                      <a:round/>
+                      <a:headEnd type="none" w="med" len="med"/>
+                      <a:tailEnd type="none" w="med" len="med"/>
+                    </a:lnL>
+                    <a:lnR w="12700" cap="flat" cmpd="sng" algn="ctr">
+                      <a:solidFill>
+                        <a:schemeClr val="tx1"/>
+                      </a:solidFill>
+                      <a:prstDash val="solid"/>
+                      <a:round/>
+                      <a:headEnd type="none" w="med" len="med"/>
+                      <a:tailEnd type="none" w="med" len="med"/>
+                    </a:lnR>
+                    <a:lnT w="12700" cap="flat" cmpd="sng" algn="ctr">
+                      <a:solidFill>
+                        <a:schemeClr val="tx1"/>
+                      </a:solidFill>
+                      <a:prstDash val="solid"/>
+                      <a:round/>
+                      <a:headEnd type="none" w="med" len="med"/>
+                      <a:tailEnd type="none" w="med" len="med"/>
+                    </a:lnT>
+                    <a:lnB w="12700" cap="flat" cmpd="sng" algn="ctr">
+                      <a:solidFill>
+                        <a:schemeClr val="tx1"/>
+                      </a:solidFill>
+                      <a:prstDash val="solid"/>
+                      <a:round/>
+                      <a:headEnd type="none" w="med" len="med"/>
+                      <a:tailEnd type="none" w="med" len="med"/>
+                    </a:lnB>
+                    <a:lnTlToBr w="12700" cmpd="sng">
+                      <a:noFill/>
+                      <a:prstDash val="solid"/>
+                    </a:lnTlToBr>
+                    <a:lnBlToTr w="12700" cmpd="sng">
+                      <a:noFill/>
+                      <a:prstDash val="solid"/>
+                    </a:lnBlToTr>
+                    <a:noFill/>
+                  </a:tcPr>
+                </a:tc>
+                <a:tc rowSpan="3">
+                  <a:txBody>
+                    <a:bodyPr/>
+                    <a:lstStyle/>
+                    <a:p>
+                      <a:pPr algn="ctr" fontAlgn="ctr"/>
+                      <a:r>
+                        <a:rPr lang="en-US" sz="1200" u="none" strike="noStrike" dirty="0">
+                          <a:effectLst/>
+                        </a:rPr>
+                        <a:t>To be discussed further subject to scope</a:t>
+                      </a:r>
+                      <a:endParaRPr lang="en-US" sz="1200" b="0" i="0" u="none" strike="noStrike" dirty="0">
+                        <a:solidFill>
+                          <a:srgbClr val="000000"/>
+                        </a:solidFill>
+                        <a:effectLst/>
+                        <a:latin typeface="Calibri" panose="020F0502020204030204" pitchFamily="34" charset="0"/>
+                      </a:endParaRPr>
+                    </a:p>
+                  </a:txBody>
+                  <a:tcPr marL="7620" marR="7620" marT="7620" marB="0" anchor="ctr">
+                    <a:lnL w="12700" cap="flat" cmpd="sng" algn="ctr">
+                      <a:solidFill>
+                        <a:schemeClr val="tx1"/>
+                      </a:solidFill>
+                      <a:prstDash val="solid"/>
+                      <a:round/>
+                      <a:headEnd type="none" w="med" len="med"/>
+                      <a:tailEnd type="none" w="med" len="med"/>
+                    </a:lnL>
+                    <a:lnR w="12700" cap="flat" cmpd="sng" algn="ctr">
+                      <a:solidFill>
+                        <a:schemeClr val="tx1"/>
+                      </a:solidFill>
+                      <a:prstDash val="solid"/>
+                      <a:round/>
+                      <a:headEnd type="none" w="med" len="med"/>
+                      <a:tailEnd type="none" w="med" len="med"/>
+                    </a:lnR>
+                    <a:lnT w="12700" cap="flat" cmpd="sng" algn="ctr">
+                      <a:solidFill>
+                        <a:schemeClr val="tx1"/>
+                      </a:solidFill>
+                      <a:prstDash val="solid"/>
+                      <a:round/>
+                      <a:headEnd type="none" w="med" len="med"/>
+                      <a:tailEnd type="none" w="med" len="med"/>
+                    </a:lnT>
+                    <a:lnB w="12700" cap="flat" cmpd="sng" algn="ctr">
+                      <a:solidFill>
+                        <a:schemeClr val="tx1"/>
+                      </a:solidFill>
+                      <a:prstDash val="solid"/>
+                      <a:round/>
+                      <a:headEnd type="none" w="med" len="med"/>
+                      <a:tailEnd type="none" w="med" len="med"/>
+                    </a:lnB>
+                    <a:lnTlToBr w="12700" cmpd="sng">
+                      <a:noFill/>
+                      <a:prstDash val="solid"/>
+                    </a:lnTlToBr>
+                    <a:lnBlToTr w="12700" cmpd="sng">
+                      <a:noFill/>
+                      <a:prstDash val="solid"/>
+                    </a:lnBlToTr>
+                    <a:noFill/>
+                  </a:tcPr>
+                </a:tc>
+                <a:extLst>
+                  <a:ext uri="{0D108BD9-81ED-4DB2-BD59-A6C34878D82A}">
+                    <a16:rowId xmlns:a16="http://schemas.microsoft.com/office/drawing/2014/main" val="3448000906"/>
+                  </a:ext>
+                </a:extLst>
+              </a:tr>
+              <a:tr h="198120">
+                <a:tc>
+                  <a:txBody>
+                    <a:bodyPr/>
+                    <a:lstStyle/>
+                    <a:p>
+                      <a:pPr algn="l" fontAlgn="b"/>
+                      <a:r>
+                        <a:rPr lang="en-US" sz="1200" u="none" strike="noStrike" dirty="0">
+                          <a:effectLst/>
+                        </a:rPr>
+                        <a:t>Maintenance and Updates to Dashboard</a:t>
+                      </a:r>
+                      <a:endParaRPr lang="en-US" sz="1200" b="0" i="0" u="none" strike="noStrike" dirty="0">
+                        <a:solidFill>
+                          <a:srgbClr val="000000"/>
+                        </a:solidFill>
+                        <a:effectLst/>
+                        <a:latin typeface="Calibri" panose="020F0502020204030204" pitchFamily="34" charset="0"/>
+                      </a:endParaRPr>
+                    </a:p>
+                  </a:txBody>
+                  <a:tcPr marL="7620" marR="7620" marT="7620" marB="0" anchor="b">
+                    <a:lnL w="12700" cap="flat" cmpd="sng" algn="ctr">
+                      <a:solidFill>
+                        <a:schemeClr val="tx1"/>
+                      </a:solidFill>
+                      <a:prstDash val="solid"/>
+                      <a:round/>
+                      <a:headEnd type="none" w="med" len="med"/>
+                      <a:tailEnd type="none" w="med" len="med"/>
+                    </a:lnL>
+                    <a:lnR w="12700" cap="flat" cmpd="sng" algn="ctr">
+                      <a:solidFill>
+                        <a:schemeClr val="tx1"/>
+                      </a:solidFill>
+                      <a:prstDash val="solid"/>
+                      <a:round/>
+                      <a:headEnd type="none" w="med" len="med"/>
+                      <a:tailEnd type="none" w="med" len="med"/>
+                    </a:lnR>
+                    <a:lnT w="12700" cap="flat" cmpd="sng" algn="ctr">
+                      <a:solidFill>
+                        <a:schemeClr val="tx1"/>
+                      </a:solidFill>
+                      <a:prstDash val="solid"/>
+                      <a:round/>
+                      <a:headEnd type="none" w="med" len="med"/>
+                      <a:tailEnd type="none" w="med" len="med"/>
+                    </a:lnT>
+                    <a:lnB w="12700" cap="flat" cmpd="sng" algn="ctr">
+                      <a:solidFill>
+                        <a:schemeClr val="tx1"/>
+                      </a:solidFill>
+                      <a:prstDash val="solid"/>
+                      <a:round/>
+                      <a:headEnd type="none" w="med" len="med"/>
+                      <a:tailEnd type="none" w="med" len="med"/>
+                    </a:lnB>
+                    <a:lnTlToBr w="12700" cmpd="sng">
+                      <a:noFill/>
+                      <a:prstDash val="solid"/>
+                    </a:lnTlToBr>
+                    <a:lnBlToTr w="12700" cmpd="sng">
+                      <a:noFill/>
+                      <a:prstDash val="solid"/>
+                    </a:lnBlToTr>
+                    <a:noFill/>
+                  </a:tcPr>
+                </a:tc>
+                <a:tc vMerge="1">
+                  <a:txBody>
+                    <a:bodyPr/>
+                    <a:lstStyle/>
+                    <a:p>
+                      <a:endParaRPr lang="en-SG"/>
+                    </a:p>
+                  </a:txBody>
+                  <a:tcPr/>
+                </a:tc>
+                <a:extLst>
+                  <a:ext uri="{0D108BD9-81ED-4DB2-BD59-A6C34878D82A}">
+                    <a16:rowId xmlns:a16="http://schemas.microsoft.com/office/drawing/2014/main" val="454990743"/>
+                  </a:ext>
+                </a:extLst>
+              </a:tr>
+              <a:tr h="198120">
+                <a:tc>
+                  <a:txBody>
+                    <a:bodyPr/>
+                    <a:lstStyle/>
+                    <a:p>
+                      <a:pPr algn="l" fontAlgn="b"/>
+                      <a:r>
+                        <a:rPr lang="en-SG" sz="1200" u="none" strike="noStrike" dirty="0">
+                          <a:effectLst/>
+                        </a:rPr>
+                        <a:t>Prediction and Modelling</a:t>
+                      </a:r>
+                      <a:endParaRPr lang="en-SG" sz="1200" b="0" i="0" u="none" strike="noStrike" dirty="0">
+                        <a:solidFill>
+                          <a:srgbClr val="000000"/>
+                        </a:solidFill>
+                        <a:effectLst/>
+                        <a:latin typeface="Calibri" panose="020F0502020204030204" pitchFamily="34" charset="0"/>
+                      </a:endParaRPr>
+                    </a:p>
+                  </a:txBody>
+                  <a:tcPr marL="7620" marR="7620" marT="7620" marB="0" anchor="b">
+                    <a:lnL w="12700" cap="flat" cmpd="sng" algn="ctr">
+                      <a:solidFill>
+                        <a:schemeClr val="tx1"/>
+                      </a:solidFill>
+                      <a:prstDash val="solid"/>
+                      <a:round/>
+                      <a:headEnd type="none" w="med" len="med"/>
+                      <a:tailEnd type="none" w="med" len="med"/>
+                    </a:lnL>
+                    <a:lnR w="12700" cap="flat" cmpd="sng" algn="ctr">
+                      <a:solidFill>
+                        <a:schemeClr val="tx1"/>
+                      </a:solidFill>
+                      <a:prstDash val="solid"/>
+                      <a:round/>
+                      <a:headEnd type="none" w="med" len="med"/>
+                      <a:tailEnd type="none" w="med" len="med"/>
+                    </a:lnR>
+                    <a:lnT w="12700" cap="flat" cmpd="sng" algn="ctr">
+                      <a:solidFill>
+                        <a:schemeClr val="tx1"/>
+                      </a:solidFill>
+                      <a:prstDash val="solid"/>
+                      <a:round/>
+                      <a:headEnd type="none" w="med" len="med"/>
+                      <a:tailEnd type="none" w="med" len="med"/>
+                    </a:lnT>
+                    <a:lnB w="12700" cap="flat" cmpd="sng" algn="ctr">
+                      <a:solidFill>
+                        <a:schemeClr val="tx1"/>
+                      </a:solidFill>
+                      <a:prstDash val="solid"/>
+                      <a:round/>
+                      <a:headEnd type="none" w="med" len="med"/>
+                      <a:tailEnd type="none" w="med" len="med"/>
+                    </a:lnB>
+                    <a:lnTlToBr w="12700" cmpd="sng">
+                      <a:noFill/>
+                      <a:prstDash val="solid"/>
+                    </a:lnTlToBr>
+                    <a:lnBlToTr w="12700" cmpd="sng">
+                      <a:noFill/>
+                      <a:prstDash val="solid"/>
+                    </a:lnBlToTr>
+                    <a:noFill/>
+                  </a:tcPr>
+                </a:tc>
+                <a:tc vMerge="1">
+                  <a:txBody>
+                    <a:bodyPr/>
+                    <a:lstStyle/>
+                    <a:p>
+                      <a:endParaRPr lang="en-SG"/>
+                    </a:p>
+                  </a:txBody>
+                  <a:tcPr/>
+                </a:tc>
+                <a:extLst>
+                  <a:ext uri="{0D108BD9-81ED-4DB2-BD59-A6C34878D82A}">
+                    <a16:rowId xmlns:a16="http://schemas.microsoft.com/office/drawing/2014/main" val="1733009500"/>
+                  </a:ext>
+                </a:extLst>
+              </a:tr>
+            </a:tbl>
+          </a:graphicData>
+        </a:graphic>
+      </p:graphicFrame>
+    </p:spTree>
+    <p:extLst>
+      <p:ext uri="{BB962C8B-B14F-4D97-AF65-F5344CB8AC3E}">
+        <p14:creationId xmlns:p14="http://schemas.microsoft.com/office/powerpoint/2010/main" val="2565566490"/>
+      </p:ext>
+    </p:extLst>
+  </p:cSld>
+  <p:clrMapOvr>
+    <a:masterClrMapping/>
+  </p:clrMapOvr>
+</p:sld>
+</file>
+
 <file path=ppt/theme/theme1.xml><?xml version="1.0" encoding="utf-8"?>
 <a:theme xmlns:a="http://schemas.openxmlformats.org/drawingml/2006/main" name="Office Theme">
   <a:themeElements>

</xml_diff>